<commit_message>
Correção de aula 04
</commit_message>
<xml_diff>
--- a/Aula04-Entrada de Dados e Botões/Aula04-Entrada de Dados e Botões.pptx
+++ b/Aula04-Entrada de Dados e Botões/Aula04-Entrada de Dados e Botões.pptx
@@ -1,127 +1,51 @@
 
 <file path=ppt/presentation.xml><?xml version="1.0" encoding="utf-8"?>
-<p:presentation xmlns:a="http://schemas.openxmlformats.org/drawingml/2006/main" xmlns:r="http://schemas.openxmlformats.org/officeDocument/2006/relationships" xmlns:p="http://schemas.openxmlformats.org/presentationml/2006/main" saveSubsetFonts="1" embedTrueTypeFonts="true">
+<p:presentation xmlns:a="http://schemas.openxmlformats.org/drawingml/2006/main" xmlns:r="http://schemas.openxmlformats.org/officeDocument/2006/relationships" xmlns:p="http://schemas.openxmlformats.org/presentationml/2006/main" embedTrueTypeFonts="1" saveSubsetFonts="1">
   <p:sldMasterIdLst>
     <p:sldMasterId id="2147483648" r:id="rId1"/>
   </p:sldMasterIdLst>
   <p:sldIdLst>
-    <p:sldId id="256" r:id="rId32"/>
-    <p:sldId id="257" r:id="rId33"/>
-    <p:sldId id="258" r:id="rId34"/>
-    <p:sldId id="259" r:id="rId35"/>
-    <p:sldId id="260" r:id="rId36"/>
-    <p:sldId id="261" r:id="rId37"/>
-    <p:sldId id="262" r:id="rId38"/>
-    <p:sldId id="263" r:id="rId39"/>
-    <p:sldId id="264" r:id="rId40"/>
-    <p:sldId id="265" r:id="rId41"/>
+    <p:sldId id="256" r:id="rId2"/>
+    <p:sldId id="257" r:id="rId3"/>
+    <p:sldId id="258" r:id="rId4"/>
+    <p:sldId id="259" r:id="rId5"/>
+    <p:sldId id="260" r:id="rId6"/>
+    <p:sldId id="261" r:id="rId7"/>
+    <p:sldId id="262" r:id="rId8"/>
+    <p:sldId id="263" r:id="rId9"/>
+    <p:sldId id="264" r:id="rId10"/>
+    <p:sldId id="265" r:id="rId11"/>
   </p:sldIdLst>
   <p:sldSz cx="18288000" cy="10287000"/>
   <p:notesSz cx="6858000" cy="9144000"/>
   <p:embeddedFontLst>
     <p:embeddedFont>
-      <p:font typeface="Arimo" charset="1" panose="020B0604020202020204"/>
-      <p:regular r:id="rId6"/>
+      <p:font typeface="Lato" panose="020F0502020204030203" pitchFamily="34" charset="0"/>
+      <p:regular r:id="rId12"/>
+      <p:bold r:id="rId13"/>
+      <p:italic r:id="rId14"/>
+      <p:boldItalic r:id="rId15"/>
     </p:embeddedFont>
     <p:embeddedFont>
-      <p:font typeface="Arimo Bold" charset="1" panose="020B0704020202020204"/>
-      <p:regular r:id="rId7"/>
+      <p:font typeface="Lato Bold" panose="020F0502020204030203" pitchFamily="34" charset="0"/>
+      <p:regular r:id="rId16"/>
+      <p:bold r:id="rId17"/>
     </p:embeddedFont>
     <p:embeddedFont>
-      <p:font typeface="Arimo Italics" charset="1" panose="020B0604020202090204"/>
-      <p:regular r:id="rId8"/>
+      <p:font typeface="Poppins" panose="00000500000000000000" pitchFamily="2" charset="0"/>
+      <p:regular r:id="rId18"/>
+      <p:bold r:id="rId19"/>
+      <p:italic r:id="rId20"/>
+      <p:boldItalic r:id="rId21"/>
     </p:embeddedFont>
     <p:embeddedFont>
-      <p:font typeface="Arimo Bold Italics" charset="1" panose="020B0704020202090204"/>
-      <p:regular r:id="rId9"/>
+      <p:font typeface="Poppins Bold" panose="00000800000000000000" pitchFamily="2" charset="0"/>
+      <p:regular r:id="rId22"/>
+      <p:bold r:id="rId23"/>
     </p:embeddedFont>
     <p:embeddedFont>
-      <p:font typeface="Lato" charset="1" panose="020F0502020204030203"/>
-      <p:regular r:id="rId10"/>
-    </p:embeddedFont>
-    <p:embeddedFont>
-      <p:font typeface="Lato Bold" charset="1" panose="020F0502020204030203"/>
-      <p:regular r:id="rId11"/>
-    </p:embeddedFont>
-    <p:embeddedFont>
-      <p:font typeface="Lato Italics" charset="1" panose="020F0502020204030203"/>
-      <p:regular r:id="rId12"/>
-    </p:embeddedFont>
-    <p:embeddedFont>
-      <p:font typeface="Lato Bold Italics" charset="1" panose="020F0502020204030203"/>
-      <p:regular r:id="rId13"/>
-    </p:embeddedFont>
-    <p:embeddedFont>
-      <p:font typeface="Poppins" charset="1" panose="00000500000000000000"/>
-      <p:regular r:id="rId14"/>
-    </p:embeddedFont>
-    <p:embeddedFont>
-      <p:font typeface="Poppins Bold" charset="1" panose="00000800000000000000"/>
-      <p:regular r:id="rId15"/>
-    </p:embeddedFont>
-    <p:embeddedFont>
-      <p:font typeface="Poppins Italics" charset="1" panose="00000500000000000000"/>
-      <p:regular r:id="rId16"/>
-    </p:embeddedFont>
-    <p:embeddedFont>
-      <p:font typeface="Poppins Bold Italics" charset="1" panose="00000800000000000000"/>
-      <p:regular r:id="rId17"/>
-    </p:embeddedFont>
-    <p:embeddedFont>
-      <p:font typeface="Poppins Thin" charset="1" panose="00000300000000000000"/>
-      <p:regular r:id="rId18"/>
-    </p:embeddedFont>
-    <p:embeddedFont>
-      <p:font typeface="Poppins Thin Italics" charset="1" panose="00000300000000000000"/>
-      <p:regular r:id="rId19"/>
-    </p:embeddedFont>
-    <p:embeddedFont>
-      <p:font typeface="Poppins Extra-Light" charset="1" panose="00000300000000000000"/>
-      <p:regular r:id="rId20"/>
-    </p:embeddedFont>
-    <p:embeddedFont>
-      <p:font typeface="Poppins Extra-Light Italics" charset="1" panose="00000300000000000000"/>
-      <p:regular r:id="rId21"/>
-    </p:embeddedFont>
-    <p:embeddedFont>
-      <p:font typeface="Poppins Light" charset="1" panose="00000400000000000000"/>
-      <p:regular r:id="rId22"/>
-    </p:embeddedFont>
-    <p:embeddedFont>
-      <p:font typeface="Poppins Light Italics" charset="1" panose="00000400000000000000"/>
-      <p:regular r:id="rId23"/>
-    </p:embeddedFont>
-    <p:embeddedFont>
-      <p:font typeface="Poppins Medium" charset="1" panose="00000600000000000000"/>
+      <p:font typeface="Poppins Ultra-Bold" panose="020B0604020202020204" charset="0"/>
       <p:regular r:id="rId24"/>
-    </p:embeddedFont>
-    <p:embeddedFont>
-      <p:font typeface="Poppins Medium Italics" charset="1" panose="00000600000000000000"/>
-      <p:regular r:id="rId25"/>
-    </p:embeddedFont>
-    <p:embeddedFont>
-      <p:font typeface="Poppins Semi-Bold" charset="1" panose="00000700000000000000"/>
-      <p:regular r:id="rId26"/>
-    </p:embeddedFont>
-    <p:embeddedFont>
-      <p:font typeface="Poppins Semi-Bold Italics" charset="1" panose="00000700000000000000"/>
-      <p:regular r:id="rId27"/>
-    </p:embeddedFont>
-    <p:embeddedFont>
-      <p:font typeface="Poppins Ultra-Bold" charset="1" panose="00000900000000000000"/>
-      <p:regular r:id="rId28"/>
-    </p:embeddedFont>
-    <p:embeddedFont>
-      <p:font typeface="Poppins Ultra-Bold Italics" charset="1" panose="00000900000000000000"/>
-      <p:regular r:id="rId29"/>
-    </p:embeddedFont>
-    <p:embeddedFont>
-      <p:font typeface="Poppins Heavy" charset="1" panose="00000A00000000000000"/>
-      <p:regular r:id="rId30"/>
-    </p:embeddedFont>
-    <p:embeddedFont>
-      <p:font typeface="Poppins Heavy Italics" charset="1" panose="00000A00000000000000"/>
-      <p:regular r:id="rId31"/>
     </p:embeddedFont>
   </p:embeddedFontLst>
   <p:defaultTextStyle>
@@ -219,7 +143,31 @@
       </a:defRPr>
     </a:lvl9pPr>
   </p:defaultTextStyle>
+  <p:extLst>
+    <p:ext uri="{EFAFB233-063F-42B5-8137-9DF3F51BA10A}">
+      <p15:sldGuideLst xmlns:p15="http://schemas.microsoft.com/office/powerpoint/2012/main">
+        <p15:guide id="1" orient="horz" pos="2160">
+          <p15:clr>
+            <a:srgbClr val="A4A3A4"/>
+          </p15:clr>
+        </p15:guide>
+        <p15:guide id="2" pos="2880">
+          <p15:clr>
+            <a:srgbClr val="A4A3A4"/>
+          </p15:clr>
+        </p15:guide>
+      </p15:sldGuideLst>
+    </p:ext>
+  </p:extLst>
 </p:presentation>
+</file>
+
+<file path=ppt/revisionInfo.xml><?xml version="1.0" encoding="utf-8"?>
+<p1510:revInfo xmlns:a="http://schemas.openxmlformats.org/drawingml/2006/main" xmlns:r="http://schemas.openxmlformats.org/officeDocument/2006/relationships" xmlns:p1510="http://schemas.microsoft.com/office/powerpoint/2015/10/main">
+  <p1510:revLst>
+    <p1510:client id="{21010D7A-2B0E-4BFE-BDBF-608A71381231}" v="80" dt="2024-03-31T17:48:09.612"/>
+  </p1510:revLst>
+</p1510:revInfo>
 </file>
 
 <file path=ppt/slideLayouts/slideLayout1.xml><?xml version="1.0" encoding="utf-8"?>
@@ -260,10 +208,9 @@
           <a:lstStyle/>
           <a:p>
             <a:r>
-              <a:rPr lang="en-US" smtClean="0"/>
+              <a:rPr lang="en-US"/>
               <a:t>Click to edit Master title style</a:t>
             </a:r>
-            <a:endParaRPr lang="en-US"/>
           </a:p>
         </p:txBody>
       </p:sp>
@@ -379,10 +326,9 @@
           </a:lstStyle>
           <a:p>
             <a:r>
-              <a:rPr lang="en-US" smtClean="0"/>
+              <a:rPr lang="en-US"/>
               <a:t>Click to edit Master subtitle style</a:t>
             </a:r>
-            <a:endParaRPr lang="en-US"/>
           </a:p>
         </p:txBody>
       </p:sp>
@@ -404,7 +350,7 @@
             <a:fld id="{1D8BD707-D9CF-40AE-B4C6-C98DA3205C09}" type="datetimeFigureOut">
               <a:rPr lang="en-US" smtClean="0"/>
               <a:pPr/>
-              <a:t>8/1/2011</a:t>
+              <a:t>3/31/2024</a:t>
             </a:fld>
             <a:endParaRPr lang="en-US"/>
           </a:p>
@@ -447,7 +393,7 @@
             <a:fld id="{B6F15528-21DE-4FAA-801E-634DDDAF4B2B}" type="slidenum">
               <a:rPr lang="en-US" smtClean="0"/>
               <a:pPr/>
-              <a:t>‹#›</a:t>
+              <a:t>‹nº›</a:t>
             </a:fld>
             <a:endParaRPr lang="en-US"/>
           </a:p>
@@ -494,10 +440,9 @@
           <a:lstStyle/>
           <a:p>
             <a:r>
-              <a:rPr lang="en-US" smtClean="0"/>
+              <a:rPr lang="en-US"/>
               <a:t>Click to edit Master title style</a:t>
             </a:r>
-            <a:endParaRPr lang="en-US"/>
           </a:p>
         </p:txBody>
       </p:sp>
@@ -518,38 +463,37 @@
           <a:p>
             <a:pPr lvl="0"/>
             <a:r>
-              <a:rPr lang="en-US" smtClean="0"/>
+              <a:rPr lang="en-US"/>
               <a:t>Click to edit Master text styles</a:t>
             </a:r>
           </a:p>
           <a:p>
             <a:pPr lvl="1"/>
             <a:r>
-              <a:rPr lang="en-US" smtClean="0"/>
+              <a:rPr lang="en-US"/>
               <a:t>Second level</a:t>
             </a:r>
           </a:p>
           <a:p>
             <a:pPr lvl="2"/>
             <a:r>
-              <a:rPr lang="en-US" smtClean="0"/>
+              <a:rPr lang="en-US"/>
               <a:t>Third level</a:t>
             </a:r>
           </a:p>
           <a:p>
             <a:pPr lvl="3"/>
             <a:r>
-              <a:rPr lang="en-US" smtClean="0"/>
+              <a:rPr lang="en-US"/>
               <a:t>Fourth level</a:t>
             </a:r>
           </a:p>
           <a:p>
             <a:pPr lvl="4"/>
             <a:r>
-              <a:rPr lang="en-US" smtClean="0"/>
+              <a:rPr lang="en-US"/>
               <a:t>Fifth level</a:t>
             </a:r>
-            <a:endParaRPr lang="en-US"/>
           </a:p>
         </p:txBody>
       </p:sp>
@@ -571,7 +515,7 @@
             <a:fld id="{1D8BD707-D9CF-40AE-B4C6-C98DA3205C09}" type="datetimeFigureOut">
               <a:rPr lang="en-US" smtClean="0"/>
               <a:pPr/>
-              <a:t>8/1/2011</a:t>
+              <a:t>3/31/2024</a:t>
             </a:fld>
             <a:endParaRPr lang="en-US"/>
           </a:p>
@@ -614,7 +558,7 @@
             <a:fld id="{B6F15528-21DE-4FAA-801E-634DDDAF4B2B}" type="slidenum">
               <a:rPr lang="en-US" smtClean="0"/>
               <a:pPr/>
-              <a:t>‹#›</a:t>
+              <a:t>‹nº›</a:t>
             </a:fld>
             <a:endParaRPr lang="en-US"/>
           </a:p>
@@ -666,10 +610,9 @@
           <a:lstStyle/>
           <a:p>
             <a:r>
-              <a:rPr lang="en-US" smtClean="0"/>
+              <a:rPr lang="en-US"/>
               <a:t>Click to edit Master title style</a:t>
             </a:r>
-            <a:endParaRPr lang="en-US"/>
           </a:p>
         </p:txBody>
       </p:sp>
@@ -695,38 +638,37 @@
           <a:p>
             <a:pPr lvl="0"/>
             <a:r>
-              <a:rPr lang="en-US" smtClean="0"/>
+              <a:rPr lang="en-US"/>
               <a:t>Click to edit Master text styles</a:t>
             </a:r>
           </a:p>
           <a:p>
             <a:pPr lvl="1"/>
             <a:r>
-              <a:rPr lang="en-US" smtClean="0"/>
+              <a:rPr lang="en-US"/>
               <a:t>Second level</a:t>
             </a:r>
           </a:p>
           <a:p>
             <a:pPr lvl="2"/>
             <a:r>
-              <a:rPr lang="en-US" smtClean="0"/>
+              <a:rPr lang="en-US"/>
               <a:t>Third level</a:t>
             </a:r>
           </a:p>
           <a:p>
             <a:pPr lvl="3"/>
             <a:r>
-              <a:rPr lang="en-US" smtClean="0"/>
+              <a:rPr lang="en-US"/>
               <a:t>Fourth level</a:t>
             </a:r>
           </a:p>
           <a:p>
             <a:pPr lvl="4"/>
             <a:r>
-              <a:rPr lang="en-US" smtClean="0"/>
+              <a:rPr lang="en-US"/>
               <a:t>Fifth level</a:t>
             </a:r>
-            <a:endParaRPr lang="en-US"/>
           </a:p>
         </p:txBody>
       </p:sp>
@@ -748,7 +690,7 @@
             <a:fld id="{1D8BD707-D9CF-40AE-B4C6-C98DA3205C09}" type="datetimeFigureOut">
               <a:rPr lang="en-US" smtClean="0"/>
               <a:pPr/>
-              <a:t>8/1/2011</a:t>
+              <a:t>3/31/2024</a:t>
             </a:fld>
             <a:endParaRPr lang="en-US"/>
           </a:p>
@@ -791,7 +733,7 @@
             <a:fld id="{B6F15528-21DE-4FAA-801E-634DDDAF4B2B}" type="slidenum">
               <a:rPr lang="en-US" smtClean="0"/>
               <a:pPr/>
-              <a:t>‹#›</a:t>
+              <a:t>‹nº›</a:t>
             </a:fld>
             <a:endParaRPr lang="en-US"/>
           </a:p>
@@ -838,10 +780,9 @@
           <a:lstStyle/>
           <a:p>
             <a:r>
-              <a:rPr lang="en-US" smtClean="0"/>
+              <a:rPr lang="en-US"/>
               <a:t>Click to edit Master title style</a:t>
             </a:r>
-            <a:endParaRPr lang="en-US"/>
           </a:p>
         </p:txBody>
       </p:sp>
@@ -862,38 +803,37 @@
           <a:p>
             <a:pPr lvl="0"/>
             <a:r>
-              <a:rPr lang="en-US" smtClean="0"/>
+              <a:rPr lang="en-US"/>
               <a:t>Click to edit Master text styles</a:t>
             </a:r>
           </a:p>
           <a:p>
             <a:pPr lvl="1"/>
             <a:r>
-              <a:rPr lang="en-US" smtClean="0"/>
+              <a:rPr lang="en-US"/>
               <a:t>Second level</a:t>
             </a:r>
           </a:p>
           <a:p>
             <a:pPr lvl="2"/>
             <a:r>
-              <a:rPr lang="en-US" smtClean="0"/>
+              <a:rPr lang="en-US"/>
               <a:t>Third level</a:t>
             </a:r>
           </a:p>
           <a:p>
             <a:pPr lvl="3"/>
             <a:r>
-              <a:rPr lang="en-US" smtClean="0"/>
+              <a:rPr lang="en-US"/>
               <a:t>Fourth level</a:t>
             </a:r>
           </a:p>
           <a:p>
             <a:pPr lvl="4"/>
             <a:r>
-              <a:rPr lang="en-US" smtClean="0"/>
+              <a:rPr lang="en-US"/>
               <a:t>Fifth level</a:t>
             </a:r>
-            <a:endParaRPr lang="en-US"/>
           </a:p>
         </p:txBody>
       </p:sp>
@@ -915,7 +855,7 @@
             <a:fld id="{1D8BD707-D9CF-40AE-B4C6-C98DA3205C09}" type="datetimeFigureOut">
               <a:rPr lang="en-US" smtClean="0"/>
               <a:pPr/>
-              <a:t>8/1/2011</a:t>
+              <a:t>3/31/2024</a:t>
             </a:fld>
             <a:endParaRPr lang="en-US"/>
           </a:p>
@@ -958,7 +898,7 @@
             <a:fld id="{B6F15528-21DE-4FAA-801E-634DDDAF4B2B}" type="slidenum">
               <a:rPr lang="en-US" smtClean="0"/>
               <a:pPr/>
-              <a:t>‹#›</a:t>
+              <a:t>‹nº›</a:t>
             </a:fld>
             <a:endParaRPr lang="en-US"/>
           </a:p>
@@ -1014,10 +954,9 @@
           </a:lstStyle>
           <a:p>
             <a:r>
-              <a:rPr lang="en-US" smtClean="0"/>
+              <a:rPr lang="en-US"/>
               <a:t>Click to edit Master title style</a:t>
             </a:r>
-            <a:endParaRPr lang="en-US"/>
           </a:p>
         </p:txBody>
       </p:sp>
@@ -1134,7 +1073,7 @@
           <a:p>
             <a:pPr lvl="0"/>
             <a:r>
-              <a:rPr lang="en-US" smtClean="0"/>
+              <a:rPr lang="en-US"/>
               <a:t>Click to edit Master text styles</a:t>
             </a:r>
           </a:p>
@@ -1158,7 +1097,7 @@
             <a:fld id="{1D8BD707-D9CF-40AE-B4C6-C98DA3205C09}" type="datetimeFigureOut">
               <a:rPr lang="en-US" smtClean="0"/>
               <a:pPr/>
-              <a:t>8/1/2011</a:t>
+              <a:t>3/31/2024</a:t>
             </a:fld>
             <a:endParaRPr lang="en-US"/>
           </a:p>
@@ -1201,7 +1140,7 @@
             <a:fld id="{B6F15528-21DE-4FAA-801E-634DDDAF4B2B}" type="slidenum">
               <a:rPr lang="en-US" smtClean="0"/>
               <a:pPr/>
-              <a:t>‹#›</a:t>
+              <a:t>‹nº›</a:t>
             </a:fld>
             <a:endParaRPr lang="en-US"/>
           </a:p>
@@ -1248,10 +1187,9 @@
           <a:lstStyle/>
           <a:p>
             <a:r>
-              <a:rPr lang="en-US" smtClean="0"/>
+              <a:rPr lang="en-US"/>
               <a:t>Click to edit Master title style</a:t>
             </a:r>
-            <a:endParaRPr lang="en-US"/>
           </a:p>
         </p:txBody>
       </p:sp>
@@ -1305,38 +1243,37 @@
           <a:p>
             <a:pPr lvl="0"/>
             <a:r>
-              <a:rPr lang="en-US" smtClean="0"/>
+              <a:rPr lang="en-US"/>
               <a:t>Click to edit Master text styles</a:t>
             </a:r>
           </a:p>
           <a:p>
             <a:pPr lvl="1"/>
             <a:r>
-              <a:rPr lang="en-US" smtClean="0"/>
+              <a:rPr lang="en-US"/>
               <a:t>Second level</a:t>
             </a:r>
           </a:p>
           <a:p>
             <a:pPr lvl="2"/>
             <a:r>
-              <a:rPr lang="en-US" smtClean="0"/>
+              <a:rPr lang="en-US"/>
               <a:t>Third level</a:t>
             </a:r>
           </a:p>
           <a:p>
             <a:pPr lvl="3"/>
             <a:r>
-              <a:rPr lang="en-US" smtClean="0"/>
+              <a:rPr lang="en-US"/>
               <a:t>Fourth level</a:t>
             </a:r>
           </a:p>
           <a:p>
             <a:pPr lvl="4"/>
             <a:r>
-              <a:rPr lang="en-US" smtClean="0"/>
+              <a:rPr lang="en-US"/>
               <a:t>Fifth level</a:t>
             </a:r>
-            <a:endParaRPr lang="en-US"/>
           </a:p>
         </p:txBody>
       </p:sp>
@@ -1390,38 +1327,37 @@
           <a:p>
             <a:pPr lvl="0"/>
             <a:r>
-              <a:rPr lang="en-US" smtClean="0"/>
+              <a:rPr lang="en-US"/>
               <a:t>Click to edit Master text styles</a:t>
             </a:r>
           </a:p>
           <a:p>
             <a:pPr lvl="1"/>
             <a:r>
-              <a:rPr lang="en-US" smtClean="0"/>
+              <a:rPr lang="en-US"/>
               <a:t>Second level</a:t>
             </a:r>
           </a:p>
           <a:p>
             <a:pPr lvl="2"/>
             <a:r>
-              <a:rPr lang="en-US" smtClean="0"/>
+              <a:rPr lang="en-US"/>
               <a:t>Third level</a:t>
             </a:r>
           </a:p>
           <a:p>
             <a:pPr lvl="3"/>
             <a:r>
-              <a:rPr lang="en-US" smtClean="0"/>
+              <a:rPr lang="en-US"/>
               <a:t>Fourth level</a:t>
             </a:r>
           </a:p>
           <a:p>
             <a:pPr lvl="4"/>
             <a:r>
-              <a:rPr lang="en-US" smtClean="0"/>
+              <a:rPr lang="en-US"/>
               <a:t>Fifth level</a:t>
             </a:r>
-            <a:endParaRPr lang="en-US"/>
           </a:p>
         </p:txBody>
       </p:sp>
@@ -1443,7 +1379,7 @@
             <a:fld id="{1D8BD707-D9CF-40AE-B4C6-C98DA3205C09}" type="datetimeFigureOut">
               <a:rPr lang="en-US" smtClean="0"/>
               <a:pPr/>
-              <a:t>8/1/2011</a:t>
+              <a:t>3/31/2024</a:t>
             </a:fld>
             <a:endParaRPr lang="en-US"/>
           </a:p>
@@ -1486,7 +1422,7 @@
             <a:fld id="{B6F15528-21DE-4FAA-801E-634DDDAF4B2B}" type="slidenum">
               <a:rPr lang="en-US" smtClean="0"/>
               <a:pPr/>
-              <a:t>‹#›</a:t>
+              <a:t>‹nº›</a:t>
             </a:fld>
             <a:endParaRPr lang="en-US"/>
           </a:p>
@@ -1537,10 +1473,9 @@
           </a:lstStyle>
           <a:p>
             <a:r>
-              <a:rPr lang="en-US" smtClean="0"/>
+              <a:rPr lang="en-US"/>
               <a:t>Click to edit Master title style</a:t>
             </a:r>
-            <a:endParaRPr lang="en-US"/>
           </a:p>
         </p:txBody>
       </p:sp>
@@ -1603,7 +1538,7 @@
           <a:p>
             <a:pPr lvl="0"/>
             <a:r>
-              <a:rPr lang="en-US" smtClean="0"/>
+              <a:rPr lang="en-US"/>
               <a:t>Click to edit Master text styles</a:t>
             </a:r>
           </a:p>
@@ -1659,38 +1594,37 @@
           <a:p>
             <a:pPr lvl="0"/>
             <a:r>
-              <a:rPr lang="en-US" smtClean="0"/>
+              <a:rPr lang="en-US"/>
               <a:t>Click to edit Master text styles</a:t>
             </a:r>
           </a:p>
           <a:p>
             <a:pPr lvl="1"/>
             <a:r>
-              <a:rPr lang="en-US" smtClean="0"/>
+              <a:rPr lang="en-US"/>
               <a:t>Second level</a:t>
             </a:r>
           </a:p>
           <a:p>
             <a:pPr lvl="2"/>
             <a:r>
-              <a:rPr lang="en-US" smtClean="0"/>
+              <a:rPr lang="en-US"/>
               <a:t>Third level</a:t>
             </a:r>
           </a:p>
           <a:p>
             <a:pPr lvl="3"/>
             <a:r>
-              <a:rPr lang="en-US" smtClean="0"/>
+              <a:rPr lang="en-US"/>
               <a:t>Fourth level</a:t>
             </a:r>
           </a:p>
           <a:p>
             <a:pPr lvl="4"/>
             <a:r>
-              <a:rPr lang="en-US" smtClean="0"/>
+              <a:rPr lang="en-US"/>
               <a:t>Fifth level</a:t>
             </a:r>
-            <a:endParaRPr lang="en-US"/>
           </a:p>
         </p:txBody>
       </p:sp>
@@ -1753,7 +1687,7 @@
           <a:p>
             <a:pPr lvl="0"/>
             <a:r>
-              <a:rPr lang="en-US" smtClean="0"/>
+              <a:rPr lang="en-US"/>
               <a:t>Click to edit Master text styles</a:t>
             </a:r>
           </a:p>
@@ -1809,38 +1743,37 @@
           <a:p>
             <a:pPr lvl="0"/>
             <a:r>
-              <a:rPr lang="en-US" smtClean="0"/>
+              <a:rPr lang="en-US"/>
               <a:t>Click to edit Master text styles</a:t>
             </a:r>
           </a:p>
           <a:p>
             <a:pPr lvl="1"/>
             <a:r>
-              <a:rPr lang="en-US" smtClean="0"/>
+              <a:rPr lang="en-US"/>
               <a:t>Second level</a:t>
             </a:r>
           </a:p>
           <a:p>
             <a:pPr lvl="2"/>
             <a:r>
-              <a:rPr lang="en-US" smtClean="0"/>
+              <a:rPr lang="en-US"/>
               <a:t>Third level</a:t>
             </a:r>
           </a:p>
           <a:p>
             <a:pPr lvl="3"/>
             <a:r>
-              <a:rPr lang="en-US" smtClean="0"/>
+              <a:rPr lang="en-US"/>
               <a:t>Fourth level</a:t>
             </a:r>
           </a:p>
           <a:p>
             <a:pPr lvl="4"/>
             <a:r>
-              <a:rPr lang="en-US" smtClean="0"/>
+              <a:rPr lang="en-US"/>
               <a:t>Fifth level</a:t>
             </a:r>
-            <a:endParaRPr lang="en-US"/>
           </a:p>
         </p:txBody>
       </p:sp>
@@ -1862,7 +1795,7 @@
             <a:fld id="{1D8BD707-D9CF-40AE-B4C6-C98DA3205C09}" type="datetimeFigureOut">
               <a:rPr lang="en-US" smtClean="0"/>
               <a:pPr/>
-              <a:t>8/1/2011</a:t>
+              <a:t>3/31/2024</a:t>
             </a:fld>
             <a:endParaRPr lang="en-US"/>
           </a:p>
@@ -1905,7 +1838,7 @@
             <a:fld id="{B6F15528-21DE-4FAA-801E-634DDDAF4B2B}" type="slidenum">
               <a:rPr lang="en-US" smtClean="0"/>
               <a:pPr/>
-              <a:t>‹#›</a:t>
+              <a:t>‹nº›</a:t>
             </a:fld>
             <a:endParaRPr lang="en-US"/>
           </a:p>
@@ -1952,10 +1885,9 @@
           <a:lstStyle/>
           <a:p>
             <a:r>
-              <a:rPr lang="en-US" smtClean="0"/>
+              <a:rPr lang="en-US"/>
               <a:t>Click to edit Master title style</a:t>
             </a:r>
-            <a:endParaRPr lang="en-US"/>
           </a:p>
         </p:txBody>
       </p:sp>
@@ -1977,7 +1909,7 @@
             <a:fld id="{1D8BD707-D9CF-40AE-B4C6-C98DA3205C09}" type="datetimeFigureOut">
               <a:rPr lang="en-US" smtClean="0"/>
               <a:pPr/>
-              <a:t>8/1/2011</a:t>
+              <a:t>3/31/2024</a:t>
             </a:fld>
             <a:endParaRPr lang="en-US"/>
           </a:p>
@@ -2020,7 +1952,7 @@
             <a:fld id="{B6F15528-21DE-4FAA-801E-634DDDAF4B2B}" type="slidenum">
               <a:rPr lang="en-US" smtClean="0"/>
               <a:pPr/>
-              <a:t>‹#›</a:t>
+              <a:t>‹nº›</a:t>
             </a:fld>
             <a:endParaRPr lang="en-US"/>
           </a:p>
@@ -2069,7 +2001,7 @@
             <a:fld id="{1D8BD707-D9CF-40AE-B4C6-C98DA3205C09}" type="datetimeFigureOut">
               <a:rPr lang="en-US" smtClean="0"/>
               <a:pPr/>
-              <a:t>8/1/2011</a:t>
+              <a:t>3/31/2024</a:t>
             </a:fld>
             <a:endParaRPr lang="en-US"/>
           </a:p>
@@ -2112,7 +2044,7 @@
             <a:fld id="{B6F15528-21DE-4FAA-801E-634DDDAF4B2B}" type="slidenum">
               <a:rPr lang="en-US" smtClean="0"/>
               <a:pPr/>
-              <a:t>‹#›</a:t>
+              <a:t>‹nº›</a:t>
             </a:fld>
             <a:endParaRPr lang="en-US"/>
           </a:p>
@@ -2168,10 +2100,9 @@
           </a:lstStyle>
           <a:p>
             <a:r>
-              <a:rPr lang="en-US" smtClean="0"/>
+              <a:rPr lang="en-US"/>
               <a:t>Click to edit Master title style</a:t>
             </a:r>
-            <a:endParaRPr lang="en-US"/>
           </a:p>
         </p:txBody>
       </p:sp>
@@ -2225,38 +2156,37 @@
           <a:p>
             <a:pPr lvl="0"/>
             <a:r>
-              <a:rPr lang="en-US" smtClean="0"/>
+              <a:rPr lang="en-US"/>
               <a:t>Click to edit Master text styles</a:t>
             </a:r>
           </a:p>
           <a:p>
             <a:pPr lvl="1"/>
             <a:r>
-              <a:rPr lang="en-US" smtClean="0"/>
+              <a:rPr lang="en-US"/>
               <a:t>Second level</a:t>
             </a:r>
           </a:p>
           <a:p>
             <a:pPr lvl="2"/>
             <a:r>
-              <a:rPr lang="en-US" smtClean="0"/>
+              <a:rPr lang="en-US"/>
               <a:t>Third level</a:t>
             </a:r>
           </a:p>
           <a:p>
             <a:pPr lvl="3"/>
             <a:r>
-              <a:rPr lang="en-US" smtClean="0"/>
+              <a:rPr lang="en-US"/>
               <a:t>Fourth level</a:t>
             </a:r>
           </a:p>
           <a:p>
             <a:pPr lvl="4"/>
             <a:r>
-              <a:rPr lang="en-US" smtClean="0"/>
+              <a:rPr lang="en-US"/>
               <a:t>Fifth level</a:t>
             </a:r>
-            <a:endParaRPr lang="en-US"/>
           </a:p>
         </p:txBody>
       </p:sp>
@@ -2319,7 +2249,7 @@
           <a:p>
             <a:pPr lvl="0"/>
             <a:r>
-              <a:rPr lang="en-US" smtClean="0"/>
+              <a:rPr lang="en-US"/>
               <a:t>Click to edit Master text styles</a:t>
             </a:r>
           </a:p>
@@ -2343,7 +2273,7 @@
             <a:fld id="{1D8BD707-D9CF-40AE-B4C6-C98DA3205C09}" type="datetimeFigureOut">
               <a:rPr lang="en-US" smtClean="0"/>
               <a:pPr/>
-              <a:t>8/1/2011</a:t>
+              <a:t>3/31/2024</a:t>
             </a:fld>
             <a:endParaRPr lang="en-US"/>
           </a:p>
@@ -2386,7 +2316,7 @@
             <a:fld id="{B6F15528-21DE-4FAA-801E-634DDDAF4B2B}" type="slidenum">
               <a:rPr lang="en-US" smtClean="0"/>
               <a:pPr/>
-              <a:t>‹#›</a:t>
+              <a:t>‹nº›</a:t>
             </a:fld>
             <a:endParaRPr lang="en-US"/>
           </a:p>
@@ -2442,10 +2372,9 @@
           </a:lstStyle>
           <a:p>
             <a:r>
-              <a:rPr lang="en-US" smtClean="0"/>
+              <a:rPr lang="en-US"/>
               <a:t>Click to edit Master title style</a:t>
             </a:r>
-            <a:endParaRPr lang="en-US"/>
           </a:p>
         </p:txBody>
       </p:sp>
@@ -2569,7 +2498,7 @@
           <a:p>
             <a:pPr lvl="0"/>
             <a:r>
-              <a:rPr lang="en-US" smtClean="0"/>
+              <a:rPr lang="en-US"/>
               <a:t>Click to edit Master text styles</a:t>
             </a:r>
           </a:p>
@@ -2593,7 +2522,7 @@
             <a:fld id="{1D8BD707-D9CF-40AE-B4C6-C98DA3205C09}" type="datetimeFigureOut">
               <a:rPr lang="en-US" smtClean="0"/>
               <a:pPr/>
-              <a:t>8/1/2011</a:t>
+              <a:t>3/31/2024</a:t>
             </a:fld>
             <a:endParaRPr lang="en-US"/>
           </a:p>
@@ -2636,7 +2565,7 @@
             <a:fld id="{B6F15528-21DE-4FAA-801E-634DDDAF4B2B}" type="slidenum">
               <a:rPr lang="en-US" smtClean="0"/>
               <a:pPr/>
-              <a:t>‹#›</a:t>
+              <a:t>‹nº›</a:t>
             </a:fld>
             <a:endParaRPr lang="en-US"/>
           </a:p>
@@ -2698,10 +2627,9 @@
           <a:lstStyle/>
           <a:p>
             <a:r>
-              <a:rPr lang="en-US" smtClean="0"/>
+              <a:rPr lang="en-US"/>
               <a:t>Click to edit Master title style</a:t>
             </a:r>
-            <a:endParaRPr lang="en-US"/>
           </a:p>
         </p:txBody>
       </p:sp>
@@ -2732,38 +2660,37 @@
           <a:p>
             <a:pPr lvl="0"/>
             <a:r>
-              <a:rPr lang="en-US" smtClean="0"/>
+              <a:rPr lang="en-US"/>
               <a:t>Click to edit Master text styles</a:t>
             </a:r>
           </a:p>
           <a:p>
             <a:pPr lvl="1"/>
             <a:r>
-              <a:rPr lang="en-US" smtClean="0"/>
+              <a:rPr lang="en-US"/>
               <a:t>Second level</a:t>
             </a:r>
           </a:p>
           <a:p>
             <a:pPr lvl="2"/>
             <a:r>
-              <a:rPr lang="en-US" smtClean="0"/>
+              <a:rPr lang="en-US"/>
               <a:t>Third level</a:t>
             </a:r>
           </a:p>
           <a:p>
             <a:pPr lvl="3"/>
             <a:r>
-              <a:rPr lang="en-US" smtClean="0"/>
+              <a:rPr lang="en-US"/>
               <a:t>Fourth level</a:t>
             </a:r>
           </a:p>
           <a:p>
             <a:pPr lvl="4"/>
             <a:r>
-              <a:rPr lang="en-US" smtClean="0"/>
+              <a:rPr lang="en-US"/>
               <a:t>Fifth level</a:t>
             </a:r>
-            <a:endParaRPr lang="en-US"/>
           </a:p>
         </p:txBody>
       </p:sp>
@@ -2803,7 +2730,7 @@
             <a:fld id="{1D8BD707-D9CF-40AE-B4C6-C98DA3205C09}" type="datetimeFigureOut">
               <a:rPr lang="en-US" smtClean="0"/>
               <a:pPr/>
-              <a:t>8/1/2011</a:t>
+              <a:t>3/31/2024</a:t>
             </a:fld>
             <a:endParaRPr lang="en-US"/>
           </a:p>
@@ -2882,7 +2809,7 @@
             <a:fld id="{B6F15528-21DE-4FAA-801E-634DDDAF4B2B}" type="slidenum">
               <a:rPr lang="en-US" smtClean="0"/>
               <a:pPr/>
-              <a:t>‹#›</a:t>
+              <a:t>‹nº›</a:t>
             </a:fld>
             <a:endParaRPr lang="en-US"/>
           </a:p>
@@ -3158,7 +3085,7 @@
 </file>
 
 <file path=ppt/slides/slide1.xml><?xml version="1.0" encoding="utf-8"?>
-<p:sld xmlns:p="http://schemas.openxmlformats.org/presentationml/2006/main" xmlns:a="http://schemas.openxmlformats.org/drawingml/2006/main" xmlns:r="http://schemas.openxmlformats.org/officeDocument/2006/relationships">
+<p:sld xmlns:a="http://schemas.openxmlformats.org/drawingml/2006/main" xmlns:r="http://schemas.openxmlformats.org/officeDocument/2006/relationships" xmlns:p="http://schemas.openxmlformats.org/presentationml/2006/main">
   <p:cSld>
     <p:spTree>
       <p:nvGrpSpPr>
@@ -3176,7 +3103,7 @@
       </p:grpSpPr>
       <p:grpSp>
         <p:nvGrpSpPr>
-          <p:cNvPr name="Group 2" id="2"/>
+          <p:cNvPr id="2" name="Group 2"/>
           <p:cNvGrpSpPr/>
           <p:nvPr/>
         </p:nvGrpSpPr>
@@ -3190,12 +3117,12 @@
         </p:grpSpPr>
         <p:sp>
           <p:nvSpPr>
-            <p:cNvPr name="Freeform 3" id="3"/>
+            <p:cNvPr id="3" name="Freeform 3"/>
             <p:cNvSpPr/>
             <p:nvPr/>
           </p:nvSpPr>
           <p:spPr>
-            <a:xfrm flipH="false" flipV="false" rot="0">
+            <a:xfrm>
               <a:off x="0" y="0"/>
               <a:ext cx="1913890" cy="1913890"/>
             </a:xfrm>
@@ -3204,9 +3131,9 @@
               <a:gdLst/>
               <a:ahLst/>
               <a:cxnLst/>
-              <a:rect r="r" b="b" t="t" l="l"/>
+              <a:rect l="l" t="t" r="r" b="b"/>
               <a:pathLst>
-                <a:path h="1913890" w="1913890">
+                <a:path w="1913890" h="1913890">
                   <a:moveTo>
                     <a:pt x="0" y="0"/>
                   </a:moveTo>
@@ -3231,7 +3158,7 @@
       </p:grpSp>
       <p:grpSp>
         <p:nvGrpSpPr>
-          <p:cNvPr name="Group 4" id="4"/>
+          <p:cNvPr id="4" name="Group 4"/>
           <p:cNvGrpSpPr/>
           <p:nvPr/>
         </p:nvGrpSpPr>
@@ -3245,12 +3172,12 @@
         </p:grpSpPr>
         <p:sp>
           <p:nvSpPr>
-            <p:cNvPr name="Freeform 5" id="5"/>
+            <p:cNvPr id="5" name="Freeform 5"/>
             <p:cNvSpPr/>
             <p:nvPr/>
           </p:nvSpPr>
           <p:spPr>
-            <a:xfrm flipH="false" flipV="false" rot="0">
+            <a:xfrm>
               <a:off x="0" y="0"/>
               <a:ext cx="1913890" cy="1913890"/>
             </a:xfrm>
@@ -3259,9 +3186,9 @@
               <a:gdLst/>
               <a:ahLst/>
               <a:cxnLst/>
-              <a:rect r="r" b="b" t="t" l="l"/>
+              <a:rect l="l" t="t" r="r" b="b"/>
               <a:pathLst>
-                <a:path h="1913890" w="1913890">
+                <a:path w="1913890" h="1913890">
                   <a:moveTo>
                     <a:pt x="0" y="0"/>
                   </a:moveTo>
@@ -3305,7 +3232,7 @@
       </p:grpSp>
       <p:grpSp>
         <p:nvGrpSpPr>
-          <p:cNvPr name="Group 6" id="6"/>
+          <p:cNvPr id="6" name="Group 6"/>
           <p:cNvGrpSpPr/>
           <p:nvPr/>
         </p:nvGrpSpPr>
@@ -3319,12 +3246,12 @@
         </p:grpSpPr>
         <p:sp>
           <p:nvSpPr>
-            <p:cNvPr name="Freeform 7" id="7"/>
+            <p:cNvPr id="7" name="Freeform 7"/>
             <p:cNvSpPr/>
             <p:nvPr/>
           </p:nvSpPr>
           <p:spPr>
-            <a:xfrm flipH="false" flipV="false" rot="0">
+            <a:xfrm>
               <a:off x="0" y="0"/>
               <a:ext cx="1620126" cy="1913890"/>
             </a:xfrm>
@@ -3333,9 +3260,9 @@
               <a:gdLst/>
               <a:ahLst/>
               <a:cxnLst/>
-              <a:rect r="r" b="b" t="t" l="l"/>
+              <a:rect l="l" t="t" r="r" b="b"/>
               <a:pathLst>
-                <a:path h="1913890" w="1620126">
+                <a:path w="1620126" h="1913890">
                   <a:moveTo>
                     <a:pt x="0" y="0"/>
                   </a:moveTo>
@@ -3379,12 +3306,12 @@
       </p:grpSp>
       <p:sp>
         <p:nvSpPr>
-          <p:cNvPr name="TextBox 8" id="8"/>
-          <p:cNvSpPr txBox="true"/>
+          <p:cNvPr id="8" name="TextBox 8"/>
+          <p:cNvSpPr txBox="1"/>
           <p:nvPr/>
         </p:nvSpPr>
         <p:spPr>
-          <a:xfrm rot="0">
+          <a:xfrm>
             <a:off x="785151" y="4093288"/>
             <a:ext cx="12616379" cy="2524151"/>
           </a:xfrm>
@@ -3393,7 +3320,7 @@
           </a:prstGeom>
         </p:spPr>
         <p:txBody>
-          <a:bodyPr anchor="t" rtlCol="false" tIns="0" lIns="0" bIns="0" rIns="0">
+          <a:bodyPr lIns="0" tIns="0" rIns="0" bIns="0" rtlCol="0" anchor="t">
             <a:spAutoFit/>
           </a:bodyPr>
           <a:lstStyle/>
@@ -3417,12 +3344,12 @@
       </p:sp>
       <p:sp>
         <p:nvSpPr>
-          <p:cNvPr name="TextBox 9" id="9"/>
-          <p:cNvSpPr txBox="true"/>
+          <p:cNvPr id="9" name="TextBox 9"/>
+          <p:cNvSpPr txBox="1"/>
           <p:nvPr/>
         </p:nvSpPr>
         <p:spPr>
-          <a:xfrm rot="0">
+          <a:xfrm>
             <a:off x="785151" y="7260387"/>
             <a:ext cx="12616379" cy="547370"/>
           </a:xfrm>
@@ -3431,7 +3358,7 @@
           </a:prstGeom>
         </p:spPr>
         <p:txBody>
-          <a:bodyPr anchor="t" rtlCol="false" tIns="0" lIns="0" bIns="0" rIns="0">
+          <a:bodyPr lIns="0" tIns="0" rIns="0" bIns="0" rtlCol="0" anchor="t">
             <a:spAutoFit/>
           </a:bodyPr>
           <a:lstStyle/>
@@ -3455,12 +3382,12 @@
       </p:sp>
       <p:sp>
         <p:nvSpPr>
-          <p:cNvPr name="Freeform 10" id="10"/>
+          <p:cNvPr id="10" name="Freeform 10"/>
           <p:cNvSpPr/>
           <p:nvPr/>
         </p:nvSpPr>
         <p:spPr>
-          <a:xfrm flipH="false" flipV="false" rot="0">
+          <a:xfrm>
             <a:off x="-4134433" y="1004889"/>
             <a:ext cx="12993464" cy="2102579"/>
           </a:xfrm>
@@ -3469,9 +3396,9 @@
             <a:gdLst/>
             <a:ahLst/>
             <a:cxnLst/>
-            <a:rect r="r" b="b" t="t" l="l"/>
+            <a:rect l="l" t="t" r="r" b="b"/>
             <a:pathLst>
-              <a:path h="2102579" w="12993464">
+              <a:path w="12993464" h="2102579">
                 <a:moveTo>
                   <a:pt x="0" y="0"/>
                 </a:moveTo>
@@ -3501,19 +3428,19 @@
               </a:extLst>
             </a:blip>
             <a:stretch>
-              <a:fillRect l="0" t="0" r="0" b="0"/>
+              <a:fillRect/>
             </a:stretch>
           </a:blipFill>
         </p:spPr>
       </p:sp>
       <p:grpSp>
         <p:nvGrpSpPr>
-          <p:cNvPr name="Group 11" id="11"/>
+          <p:cNvPr id="11" name="Group 11"/>
           <p:cNvGrpSpPr/>
           <p:nvPr/>
         </p:nvGrpSpPr>
         <p:grpSpPr>
-          <a:xfrm rot="0">
+          <a:xfrm>
             <a:off x="0" y="0"/>
             <a:ext cx="541602" cy="10287000"/>
             <a:chOff x="0" y="0"/>
@@ -3522,12 +3449,12 @@
         </p:grpSpPr>
         <p:sp>
           <p:nvSpPr>
-            <p:cNvPr name="Freeform 12" id="12"/>
+            <p:cNvPr id="12" name="Freeform 12"/>
             <p:cNvSpPr/>
             <p:nvPr/>
           </p:nvSpPr>
           <p:spPr>
-            <a:xfrm flipH="false" flipV="false" rot="0">
+            <a:xfrm>
               <a:off x="0" y="0"/>
               <a:ext cx="157867" cy="2998468"/>
             </a:xfrm>
@@ -3536,9 +3463,9 @@
               <a:gdLst/>
               <a:ahLst/>
               <a:cxnLst/>
-              <a:rect r="r" b="b" t="t" l="l"/>
+              <a:rect l="l" t="t" r="r" b="b"/>
               <a:pathLst>
-                <a:path h="2998468" w="157867">
+                <a:path w="157867" h="2998468">
                   <a:moveTo>
                     <a:pt x="0" y="0"/>
                   </a:moveTo>
@@ -3570,7 +3497,7 @@
 </file>
 
 <file path=ppt/slides/slide10.xml><?xml version="1.0" encoding="utf-8"?>
-<p:sld xmlns:p="http://schemas.openxmlformats.org/presentationml/2006/main" xmlns:a="http://schemas.openxmlformats.org/drawingml/2006/main">
+<p:sld xmlns:a="http://schemas.openxmlformats.org/drawingml/2006/main" xmlns:r="http://schemas.openxmlformats.org/officeDocument/2006/relationships" xmlns:p="http://schemas.openxmlformats.org/presentationml/2006/main">
   <p:cSld>
     <p:spTree>
       <p:nvGrpSpPr>
@@ -3588,12 +3515,12 @@
       </p:grpSpPr>
       <p:sp>
         <p:nvSpPr>
-          <p:cNvPr name="TextBox 2" id="2"/>
-          <p:cNvSpPr txBox="true"/>
+          <p:cNvPr id="2" name="TextBox 2"/>
+          <p:cNvSpPr txBox="1"/>
           <p:nvPr/>
         </p:nvSpPr>
         <p:spPr>
-          <a:xfrm rot="0">
+          <a:xfrm>
             <a:off x="4716086" y="379832"/>
             <a:ext cx="8855829" cy="895350"/>
           </a:xfrm>
@@ -3602,7 +3529,7 @@
           </a:prstGeom>
         </p:spPr>
         <p:txBody>
-          <a:bodyPr anchor="t" rtlCol="false" tIns="0" lIns="0" bIns="0" rIns="0">
+          <a:bodyPr lIns="0" tIns="0" rIns="0" bIns="0" rtlCol="0" anchor="t">
             <a:spAutoFit/>
           </a:bodyPr>
           <a:lstStyle/>
@@ -3626,12 +3553,12 @@
       </p:sp>
       <p:sp>
         <p:nvSpPr>
-          <p:cNvPr name="TextBox 3" id="3"/>
-          <p:cNvSpPr txBox="true"/>
+          <p:cNvPr id="3" name="TextBox 3"/>
+          <p:cNvSpPr txBox="1"/>
           <p:nvPr/>
         </p:nvSpPr>
         <p:spPr>
-          <a:xfrm rot="0">
+          <a:xfrm>
             <a:off x="816673" y="1512139"/>
             <a:ext cx="16442627" cy="6975377"/>
           </a:xfrm>
@@ -3640,7 +3567,7 @@
           </a:prstGeom>
         </p:spPr>
         <p:txBody>
-          <a:bodyPr anchor="t" rtlCol="false" tIns="0" lIns="0" bIns="0" rIns="0">
+          <a:bodyPr lIns="0" tIns="0" rIns="0" bIns="0" rtlCol="0" anchor="t">
             <a:spAutoFit/>
           </a:bodyPr>
           <a:lstStyle/>
@@ -3675,6 +3602,12 @@
                 <a:spcPts val="4631"/>
               </a:lnSpc>
             </a:pPr>
+            <a:endParaRPr lang="en-US" sz="3067" spc="153">
+              <a:solidFill>
+                <a:srgbClr val="000000"/>
+              </a:solidFill>
+              <a:latin typeface="Poppins"/>
+            </a:endParaRPr>
           </a:p>
           <a:p>
             <a:pPr algn="just">
@@ -3707,6 +3640,12 @@
                 <a:spcPts val="4631"/>
               </a:lnSpc>
             </a:pPr>
+            <a:endParaRPr lang="en-US" sz="3067" spc="153">
+              <a:solidFill>
+                <a:srgbClr val="000000"/>
+              </a:solidFill>
+              <a:latin typeface="Poppins"/>
+            </a:endParaRPr>
           </a:p>
           <a:p>
             <a:pPr algn="just">
@@ -3739,6 +3678,12 @@
                 <a:spcPts val="4631"/>
               </a:lnSpc>
             </a:pPr>
+            <a:endParaRPr lang="en-US" sz="3067" spc="153">
+              <a:solidFill>
+                <a:srgbClr val="000000"/>
+              </a:solidFill>
+              <a:latin typeface="Poppins"/>
+            </a:endParaRPr>
           </a:p>
           <a:p>
             <a:pPr algn="just">
@@ -3746,12 +3691,18 @@
                 <a:spcPts val="4631"/>
               </a:lnSpc>
             </a:pPr>
+            <a:endParaRPr lang="en-US" sz="3067" spc="153">
+              <a:solidFill>
+                <a:srgbClr val="000000"/>
+              </a:solidFill>
+              <a:latin typeface="Poppins"/>
+            </a:endParaRPr>
           </a:p>
         </p:txBody>
       </p:sp>
       <p:grpSp>
         <p:nvGrpSpPr>
-          <p:cNvPr name="Group 4" id="4"/>
+          <p:cNvPr id="4" name="Group 4"/>
           <p:cNvGrpSpPr/>
           <p:nvPr/>
         </p:nvGrpSpPr>
@@ -3765,12 +3716,12 @@
         </p:grpSpPr>
         <p:sp>
           <p:nvSpPr>
-            <p:cNvPr name="Freeform 5" id="5"/>
+            <p:cNvPr id="5" name="Freeform 5"/>
             <p:cNvSpPr/>
             <p:nvPr/>
           </p:nvSpPr>
           <p:spPr>
-            <a:xfrm flipH="false" flipV="false" rot="0">
+            <a:xfrm>
               <a:off x="0" y="0"/>
               <a:ext cx="6350000" cy="6339840"/>
             </a:xfrm>
@@ -3779,9 +3730,9 @@
               <a:gdLst/>
               <a:ahLst/>
               <a:cxnLst/>
-              <a:rect r="r" b="b" t="t" l="l"/>
+              <a:rect l="l" t="t" r="r" b="b"/>
               <a:pathLst>
-                <a:path h="6339840" w="6350000">
+                <a:path w="6350000" h="6339840">
                   <a:moveTo>
                     <a:pt x="6350000" y="6339840"/>
                   </a:moveTo>
@@ -3813,7 +3764,7 @@
 </file>
 
 <file path=ppt/slides/slide2.xml><?xml version="1.0" encoding="utf-8"?>
-<p:sld xmlns:p="http://schemas.openxmlformats.org/presentationml/2006/main" xmlns:a="http://schemas.openxmlformats.org/drawingml/2006/main">
+<p:sld xmlns:a="http://schemas.openxmlformats.org/drawingml/2006/main" xmlns:r="http://schemas.openxmlformats.org/officeDocument/2006/relationships" xmlns:p="http://schemas.openxmlformats.org/presentationml/2006/main">
   <p:cSld>
     <p:spTree>
       <p:nvGrpSpPr>
@@ -3831,12 +3782,12 @@
       </p:grpSpPr>
       <p:grpSp>
         <p:nvGrpSpPr>
-          <p:cNvPr name="Group 2" id="2"/>
+          <p:cNvPr id="2" name="Group 2"/>
           <p:cNvGrpSpPr/>
           <p:nvPr/>
         </p:nvGrpSpPr>
         <p:grpSpPr>
-          <a:xfrm rot="0">
+          <a:xfrm>
             <a:off x="1376816" y="0"/>
             <a:ext cx="452408" cy="10287000"/>
             <a:chOff x="0" y="0"/>
@@ -3845,12 +3796,12 @@
         </p:grpSpPr>
         <p:sp>
           <p:nvSpPr>
-            <p:cNvPr name="Freeform 3" id="3"/>
+            <p:cNvPr id="3" name="Freeform 3"/>
             <p:cNvSpPr/>
             <p:nvPr/>
           </p:nvSpPr>
           <p:spPr>
-            <a:xfrm flipH="false" flipV="false" rot="0">
+            <a:xfrm>
               <a:off x="0" y="0"/>
               <a:ext cx="165040" cy="3752726"/>
             </a:xfrm>
@@ -3859,9 +3810,9 @@
               <a:gdLst/>
               <a:ahLst/>
               <a:cxnLst/>
-              <a:rect r="r" b="b" t="t" l="l"/>
+              <a:rect l="l" t="t" r="r" b="b"/>
               <a:pathLst>
-                <a:path h="3752726" w="165040">
+                <a:path w="165040" h="3752726">
                   <a:moveTo>
                     <a:pt x="0" y="0"/>
                   </a:moveTo>
@@ -3886,7 +3837,7 @@
       </p:grpSp>
       <p:grpSp>
         <p:nvGrpSpPr>
-          <p:cNvPr name="Group 4" id="4"/>
+          <p:cNvPr id="4" name="Group 4"/>
           <p:cNvGrpSpPr/>
           <p:nvPr/>
         </p:nvGrpSpPr>
@@ -3900,12 +3851,12 @@
         </p:grpSpPr>
         <p:sp>
           <p:nvSpPr>
-            <p:cNvPr name="Freeform 5" id="5"/>
+            <p:cNvPr id="5" name="Freeform 5"/>
             <p:cNvSpPr/>
             <p:nvPr/>
           </p:nvSpPr>
           <p:spPr>
-            <a:xfrm flipH="false" flipV="false" rot="0">
+            <a:xfrm>
               <a:off x="0" y="0"/>
               <a:ext cx="1913890" cy="1913890"/>
             </a:xfrm>
@@ -3914,9 +3865,9 @@
               <a:gdLst/>
               <a:ahLst/>
               <a:cxnLst/>
-              <a:rect r="r" b="b" t="t" l="l"/>
+              <a:rect l="l" t="t" r="r" b="b"/>
               <a:pathLst>
-                <a:path h="1913890" w="1913890">
+                <a:path w="1913890" h="1913890">
                   <a:moveTo>
                     <a:pt x="0" y="0"/>
                   </a:moveTo>
@@ -3941,7 +3892,7 @@
       </p:grpSp>
       <p:grpSp>
         <p:nvGrpSpPr>
-          <p:cNvPr name="Group 6" id="6"/>
+          <p:cNvPr id="6" name="Group 6"/>
           <p:cNvGrpSpPr/>
           <p:nvPr/>
         </p:nvGrpSpPr>
@@ -3955,12 +3906,12 @@
         </p:grpSpPr>
         <p:sp>
           <p:nvSpPr>
-            <p:cNvPr name="Freeform 7" id="7"/>
+            <p:cNvPr id="7" name="Freeform 7"/>
             <p:cNvSpPr/>
             <p:nvPr/>
           </p:nvSpPr>
           <p:spPr>
-            <a:xfrm flipH="false" flipV="false" rot="0">
+            <a:xfrm>
               <a:off x="0" y="0"/>
               <a:ext cx="1913890" cy="1913890"/>
             </a:xfrm>
@@ -3969,9 +3920,9 @@
               <a:gdLst/>
               <a:ahLst/>
               <a:cxnLst/>
-              <a:rect r="r" b="b" t="t" l="l"/>
+              <a:rect l="l" t="t" r="r" b="b"/>
               <a:pathLst>
-                <a:path h="1913890" w="1913890">
+                <a:path w="1913890" h="1913890">
                   <a:moveTo>
                     <a:pt x="0" y="0"/>
                   </a:moveTo>
@@ -4015,7 +3966,7 @@
       </p:grpSp>
       <p:grpSp>
         <p:nvGrpSpPr>
-          <p:cNvPr name="Group 8" id="8"/>
+          <p:cNvPr id="8" name="Group 8"/>
           <p:cNvGrpSpPr/>
           <p:nvPr/>
         </p:nvGrpSpPr>
@@ -4029,12 +3980,12 @@
         </p:grpSpPr>
         <p:sp>
           <p:nvSpPr>
-            <p:cNvPr name="Freeform 9" id="9"/>
+            <p:cNvPr id="9" name="Freeform 9"/>
             <p:cNvSpPr/>
             <p:nvPr/>
           </p:nvSpPr>
           <p:spPr>
-            <a:xfrm flipH="false" flipV="false" rot="0">
+            <a:xfrm>
               <a:off x="0" y="0"/>
               <a:ext cx="1913890" cy="1913890"/>
             </a:xfrm>
@@ -4043,9 +3994,9 @@
               <a:gdLst/>
               <a:ahLst/>
               <a:cxnLst/>
-              <a:rect r="r" b="b" t="t" l="l"/>
+              <a:rect l="l" t="t" r="r" b="b"/>
               <a:pathLst>
-                <a:path h="1913890" w="1913890">
+                <a:path w="1913890" h="1913890">
                   <a:moveTo>
                     <a:pt x="0" y="0"/>
                   </a:moveTo>
@@ -4089,7 +4040,7 @@
       </p:grpSp>
       <p:grpSp>
         <p:nvGrpSpPr>
-          <p:cNvPr name="Group 10" id="10"/>
+          <p:cNvPr id="10" name="Group 10"/>
           <p:cNvGrpSpPr/>
           <p:nvPr/>
         </p:nvGrpSpPr>
@@ -4103,12 +4054,12 @@
         </p:grpSpPr>
         <p:sp>
           <p:nvSpPr>
-            <p:cNvPr name="Freeform 11" id="11"/>
+            <p:cNvPr id="11" name="Freeform 11"/>
             <p:cNvSpPr/>
             <p:nvPr/>
           </p:nvSpPr>
           <p:spPr>
-            <a:xfrm flipH="false" flipV="false" rot="0">
+            <a:xfrm>
               <a:off x="0" y="0"/>
               <a:ext cx="1913890" cy="1913890"/>
             </a:xfrm>
@@ -4117,9 +4068,9 @@
               <a:gdLst/>
               <a:ahLst/>
               <a:cxnLst/>
-              <a:rect r="r" b="b" t="t" l="l"/>
+              <a:rect l="l" t="t" r="r" b="b"/>
               <a:pathLst>
-                <a:path h="1913890" w="1913890">
+                <a:path w="1913890" h="1913890">
                   <a:moveTo>
                     <a:pt x="0" y="0"/>
                   </a:moveTo>
@@ -4163,7 +4114,7 @@
       </p:grpSp>
       <p:grpSp>
         <p:nvGrpSpPr>
-          <p:cNvPr name="Group 12" id="12"/>
+          <p:cNvPr id="12" name="Group 12"/>
           <p:cNvGrpSpPr/>
           <p:nvPr/>
         </p:nvGrpSpPr>
@@ -4177,12 +4128,12 @@
         </p:grpSpPr>
         <p:sp>
           <p:nvSpPr>
-            <p:cNvPr name="Freeform 13" id="13"/>
+            <p:cNvPr id="13" name="Freeform 13"/>
             <p:cNvSpPr/>
             <p:nvPr/>
           </p:nvSpPr>
           <p:spPr>
-            <a:xfrm flipH="false" flipV="false" rot="0">
+            <a:xfrm>
               <a:off x="0" y="0"/>
               <a:ext cx="2353310" cy="11492046"/>
             </a:xfrm>
@@ -4191,9 +4142,9 @@
               <a:gdLst/>
               <a:ahLst/>
               <a:cxnLst/>
-              <a:rect r="r" b="b" t="t" l="l"/>
+              <a:rect l="l" t="t" r="r" b="b"/>
               <a:pathLst>
-                <a:path h="11492046" w="2353310">
+                <a:path w="2353310" h="11492046">
                   <a:moveTo>
                     <a:pt x="784860" y="11424736"/>
                   </a:moveTo>
@@ -4243,12 +4194,12 @@
       </p:grpSp>
       <p:sp>
         <p:nvSpPr>
-          <p:cNvPr name="TextBox 14" id="14"/>
-          <p:cNvSpPr txBox="true"/>
+          <p:cNvPr id="14" name="TextBox 14"/>
+          <p:cNvSpPr txBox="1"/>
           <p:nvPr/>
         </p:nvSpPr>
         <p:spPr>
-          <a:xfrm rot="0">
+          <a:xfrm>
             <a:off x="2123218" y="878380"/>
             <a:ext cx="7020782" cy="895269"/>
           </a:xfrm>
@@ -4257,7 +4208,7 @@
           </a:prstGeom>
         </p:spPr>
         <p:txBody>
-          <a:bodyPr anchor="t" rtlCol="false" tIns="0" lIns="0" bIns="0" rIns="0">
+          <a:bodyPr lIns="0" tIns="0" rIns="0" bIns="0" rtlCol="0" anchor="t">
             <a:spAutoFit/>
           </a:bodyPr>
           <a:lstStyle/>
@@ -4281,7 +4232,7 @@
       </p:sp>
       <p:grpSp>
         <p:nvGrpSpPr>
-          <p:cNvPr name="Group 15" id="15"/>
+          <p:cNvPr id="15" name="Group 15"/>
           <p:cNvGrpSpPr/>
           <p:nvPr/>
         </p:nvGrpSpPr>
@@ -4295,12 +4246,12 @@
         </p:grpSpPr>
         <p:sp>
           <p:nvSpPr>
-            <p:cNvPr name="Freeform 16" id="16"/>
+            <p:cNvPr id="16" name="Freeform 16"/>
             <p:cNvSpPr/>
             <p:nvPr/>
           </p:nvSpPr>
           <p:spPr>
-            <a:xfrm flipH="false" flipV="false" rot="0">
+            <a:xfrm>
               <a:off x="0" y="0"/>
               <a:ext cx="2353310" cy="5581882"/>
             </a:xfrm>
@@ -4309,9 +4260,9 @@
               <a:gdLst/>
               <a:ahLst/>
               <a:cxnLst/>
-              <a:rect r="r" b="b" t="t" l="l"/>
+              <a:rect l="l" t="t" r="r" b="b"/>
               <a:pathLst>
-                <a:path h="5581882" w="2353310">
+                <a:path w="2353310" h="5581882">
                   <a:moveTo>
                     <a:pt x="784860" y="5514572"/>
                   </a:moveTo>
@@ -4361,7 +4312,7 @@
       </p:grpSp>
       <p:grpSp>
         <p:nvGrpSpPr>
-          <p:cNvPr name="Group 17" id="17"/>
+          <p:cNvPr id="17" name="Group 17"/>
           <p:cNvGrpSpPr/>
           <p:nvPr/>
         </p:nvGrpSpPr>
@@ -4375,12 +4326,12 @@
         </p:grpSpPr>
         <p:sp>
           <p:nvSpPr>
-            <p:cNvPr name="Freeform 18" id="18"/>
+            <p:cNvPr id="18" name="Freeform 18"/>
             <p:cNvSpPr/>
             <p:nvPr/>
           </p:nvSpPr>
           <p:spPr>
-            <a:xfrm flipH="false" flipV="false" rot="0">
+            <a:xfrm>
               <a:off x="0" y="0"/>
               <a:ext cx="2353310" cy="5581882"/>
             </a:xfrm>
@@ -4389,9 +4340,9 @@
               <a:gdLst/>
               <a:ahLst/>
               <a:cxnLst/>
-              <a:rect r="r" b="b" t="t" l="l"/>
+              <a:rect l="l" t="t" r="r" b="b"/>
               <a:pathLst>
-                <a:path h="5581882" w="2353310">
+                <a:path w="2353310" h="5581882">
                   <a:moveTo>
                     <a:pt x="784860" y="5514572"/>
                   </a:moveTo>
@@ -4441,7 +4392,7 @@
       </p:grpSp>
       <p:grpSp>
         <p:nvGrpSpPr>
-          <p:cNvPr name="Group 19" id="19"/>
+          <p:cNvPr id="19" name="Group 19"/>
           <p:cNvGrpSpPr/>
           <p:nvPr/>
         </p:nvGrpSpPr>
@@ -4455,12 +4406,12 @@
         </p:grpSpPr>
         <p:sp>
           <p:nvSpPr>
-            <p:cNvPr name="Freeform 20" id="20"/>
+            <p:cNvPr id="20" name="Freeform 20"/>
             <p:cNvSpPr/>
             <p:nvPr/>
           </p:nvSpPr>
           <p:spPr>
-            <a:xfrm flipH="false" flipV="false" rot="0">
+            <a:xfrm>
               <a:off x="0" y="0"/>
               <a:ext cx="2353310" cy="5581882"/>
             </a:xfrm>
@@ -4469,9 +4420,9 @@
               <a:gdLst/>
               <a:ahLst/>
               <a:cxnLst/>
-              <a:rect r="r" b="b" t="t" l="l"/>
+              <a:rect l="l" t="t" r="r" b="b"/>
               <a:pathLst>
-                <a:path h="5581882" w="2353310">
+                <a:path w="2353310" h="5581882">
                   <a:moveTo>
                     <a:pt x="784860" y="5514572"/>
                   </a:moveTo>
@@ -4521,12 +4472,12 @@
       </p:grpSp>
       <p:sp>
         <p:nvSpPr>
-          <p:cNvPr name="TextBox 21" id="21"/>
-          <p:cNvSpPr txBox="true"/>
+          <p:cNvPr id="21" name="TextBox 21"/>
+          <p:cNvSpPr txBox="1"/>
           <p:nvPr/>
         </p:nvSpPr>
         <p:spPr>
-          <a:xfrm rot="0">
+          <a:xfrm>
             <a:off x="2123218" y="3176705"/>
             <a:ext cx="7343333" cy="606425"/>
           </a:xfrm>
@@ -4535,7 +4486,7 @@
           </a:prstGeom>
         </p:spPr>
         <p:txBody>
-          <a:bodyPr anchor="t" rtlCol="false" tIns="0" lIns="0" bIns="0" rIns="0">
+          <a:bodyPr lIns="0" tIns="0" rIns="0" bIns="0" rtlCol="0" anchor="t">
             <a:spAutoFit/>
           </a:bodyPr>
           <a:lstStyle/>
@@ -4559,12 +4510,12 @@
       </p:sp>
       <p:sp>
         <p:nvSpPr>
-          <p:cNvPr name="TextBox 22" id="22"/>
-          <p:cNvSpPr txBox="true"/>
+          <p:cNvPr id="22" name="TextBox 22"/>
+          <p:cNvSpPr txBox="1"/>
           <p:nvPr/>
         </p:nvSpPr>
         <p:spPr>
-          <a:xfrm rot="0">
+          <a:xfrm>
             <a:off x="2123218" y="4526080"/>
             <a:ext cx="7343333" cy="606425"/>
           </a:xfrm>
@@ -4573,7 +4524,7 @@
           </a:prstGeom>
         </p:spPr>
         <p:txBody>
-          <a:bodyPr anchor="t" rtlCol="false" tIns="0" lIns="0" bIns="0" rIns="0">
+          <a:bodyPr lIns="0" tIns="0" rIns="0" bIns="0" rtlCol="0" anchor="t">
             <a:spAutoFit/>
           </a:bodyPr>
           <a:lstStyle/>
@@ -4597,12 +4548,12 @@
       </p:sp>
       <p:sp>
         <p:nvSpPr>
-          <p:cNvPr name="TextBox 23" id="23"/>
-          <p:cNvSpPr txBox="true"/>
+          <p:cNvPr id="23" name="TextBox 23"/>
+          <p:cNvSpPr txBox="1"/>
           <p:nvPr/>
         </p:nvSpPr>
         <p:spPr>
-          <a:xfrm rot="0">
+          <a:xfrm>
             <a:off x="2123218" y="5855352"/>
             <a:ext cx="7343333" cy="606425"/>
           </a:xfrm>
@@ -4611,7 +4562,7 @@
           </a:prstGeom>
         </p:spPr>
         <p:txBody>
-          <a:bodyPr anchor="t" rtlCol="false" tIns="0" lIns="0" bIns="0" rIns="0">
+          <a:bodyPr lIns="0" tIns="0" rIns="0" bIns="0" rtlCol="0" anchor="t">
             <a:spAutoFit/>
           </a:bodyPr>
           <a:lstStyle/>
@@ -4642,7 +4593,7 @@
 </file>
 
 <file path=ppt/slides/slide3.xml><?xml version="1.0" encoding="utf-8"?>
-<p:sld xmlns:p="http://schemas.openxmlformats.org/presentationml/2006/main" xmlns:a="http://schemas.openxmlformats.org/drawingml/2006/main">
+<p:sld xmlns:a="http://schemas.openxmlformats.org/drawingml/2006/main" xmlns:r="http://schemas.openxmlformats.org/officeDocument/2006/relationships" xmlns:p="http://schemas.openxmlformats.org/presentationml/2006/main">
   <p:cSld>
     <p:spTree>
       <p:nvGrpSpPr>
@@ -4660,12 +4611,12 @@
       </p:grpSpPr>
       <p:sp>
         <p:nvSpPr>
-          <p:cNvPr name="TextBox 2" id="2"/>
-          <p:cNvSpPr txBox="true"/>
+          <p:cNvPr id="2" name="TextBox 2"/>
+          <p:cNvSpPr txBox="1"/>
           <p:nvPr/>
         </p:nvSpPr>
         <p:spPr>
-          <a:xfrm rot="0">
+          <a:xfrm>
             <a:off x="4716086" y="379832"/>
             <a:ext cx="8855829" cy="895350"/>
           </a:xfrm>
@@ -4674,7 +4625,7 @@
           </a:prstGeom>
         </p:spPr>
         <p:txBody>
-          <a:bodyPr anchor="t" rtlCol="false" tIns="0" lIns="0" bIns="0" rIns="0">
+          <a:bodyPr lIns="0" tIns="0" rIns="0" bIns="0" rtlCol="0" anchor="t">
             <a:spAutoFit/>
           </a:bodyPr>
           <a:lstStyle/>
@@ -4698,12 +4649,12 @@
       </p:sp>
       <p:sp>
         <p:nvSpPr>
-          <p:cNvPr name="TextBox 3" id="3"/>
-          <p:cNvSpPr txBox="true"/>
+          <p:cNvPr id="3" name="TextBox 3"/>
+          <p:cNvSpPr txBox="1"/>
           <p:nvPr/>
         </p:nvSpPr>
         <p:spPr>
-          <a:xfrm rot="0">
+          <a:xfrm>
             <a:off x="125452" y="4971244"/>
             <a:ext cx="17259300" cy="2463800"/>
           </a:xfrm>
@@ -4712,12 +4663,12 @@
           </a:prstGeom>
         </p:spPr>
         <p:txBody>
-          <a:bodyPr anchor="t" rtlCol="false" tIns="0" lIns="0" bIns="0" rIns="0">
+          <a:bodyPr lIns="0" tIns="0" rIns="0" bIns="0" rtlCol="0" anchor="t">
             <a:spAutoFit/>
           </a:bodyPr>
           <a:lstStyle/>
           <a:p>
-            <a:pPr algn="just" marL="755651" indent="-377825" lvl="1">
+            <a:pPr marL="755651" lvl="1" indent="-377825" algn="just">
               <a:lnSpc>
                 <a:spcPts val="4900"/>
               </a:lnSpc>
@@ -4738,7 +4689,7 @@
       </p:sp>
       <p:grpSp>
         <p:nvGrpSpPr>
-          <p:cNvPr name="Group 4" id="4"/>
+          <p:cNvPr id="4" name="Group 4"/>
           <p:cNvGrpSpPr/>
           <p:nvPr/>
         </p:nvGrpSpPr>
@@ -4752,12 +4703,12 @@
         </p:grpSpPr>
         <p:sp>
           <p:nvSpPr>
-            <p:cNvPr name="Freeform 5" id="5"/>
+            <p:cNvPr id="5" name="Freeform 5"/>
             <p:cNvSpPr/>
             <p:nvPr/>
           </p:nvSpPr>
           <p:spPr>
-            <a:xfrm flipH="false" flipV="false" rot="0">
+            <a:xfrm>
               <a:off x="0" y="0"/>
               <a:ext cx="6350000" cy="6339840"/>
             </a:xfrm>
@@ -4766,9 +4717,9 @@
               <a:gdLst/>
               <a:ahLst/>
               <a:cxnLst/>
-              <a:rect r="r" b="b" t="t" l="l"/>
+              <a:rect l="l" t="t" r="r" b="b"/>
               <a:pathLst>
-                <a:path h="6339840" w="6350000">
+                <a:path w="6350000" h="6339840">
                   <a:moveTo>
                     <a:pt x="6350000" y="6339840"/>
                   </a:moveTo>
@@ -4793,12 +4744,12 @@
       </p:grpSp>
       <p:sp>
         <p:nvSpPr>
-          <p:cNvPr name="TextBox 6" id="6"/>
-          <p:cNvSpPr txBox="true"/>
+          <p:cNvPr id="6" name="TextBox 6"/>
+          <p:cNvSpPr txBox="1"/>
           <p:nvPr/>
         </p:nvSpPr>
         <p:spPr>
-          <a:xfrm rot="0">
+          <a:xfrm>
             <a:off x="125452" y="2831962"/>
             <a:ext cx="17259300" cy="1225550"/>
           </a:xfrm>
@@ -4807,12 +4758,12 @@
           </a:prstGeom>
         </p:spPr>
         <p:txBody>
-          <a:bodyPr anchor="t" rtlCol="false" tIns="0" lIns="0" bIns="0" rIns="0">
+          <a:bodyPr lIns="0" tIns="0" rIns="0" bIns="0" rtlCol="0" anchor="t">
             <a:spAutoFit/>
           </a:bodyPr>
           <a:lstStyle/>
           <a:p>
-            <a:pPr algn="just" marL="755651" indent="-377825" lvl="1">
+            <a:pPr marL="755651" lvl="1" indent="-377825" algn="just">
               <a:lnSpc>
                 <a:spcPts val="4900"/>
               </a:lnSpc>
@@ -4840,7 +4791,7 @@
 </file>
 
 <file path=ppt/slides/slide4.xml><?xml version="1.0" encoding="utf-8"?>
-<p:sld xmlns:p="http://schemas.openxmlformats.org/presentationml/2006/main" xmlns:a="http://schemas.openxmlformats.org/drawingml/2006/main" xmlns:r="http://schemas.openxmlformats.org/officeDocument/2006/relationships">
+<p:sld xmlns:a="http://schemas.openxmlformats.org/drawingml/2006/main" xmlns:r="http://schemas.openxmlformats.org/officeDocument/2006/relationships" xmlns:p="http://schemas.openxmlformats.org/presentationml/2006/main">
   <p:cSld>
     <p:spTree>
       <p:nvGrpSpPr>
@@ -4858,7 +4809,7 @@
       </p:grpSpPr>
       <p:grpSp>
         <p:nvGrpSpPr>
-          <p:cNvPr name="Group 2" id="2"/>
+          <p:cNvPr id="2" name="Group 2"/>
           <p:cNvGrpSpPr/>
           <p:nvPr/>
         </p:nvGrpSpPr>
@@ -4872,12 +4823,12 @@
         </p:grpSpPr>
         <p:sp>
           <p:nvSpPr>
-            <p:cNvPr name="Freeform 3" id="3"/>
+            <p:cNvPr id="3" name="Freeform 3"/>
             <p:cNvSpPr/>
             <p:nvPr/>
           </p:nvSpPr>
           <p:spPr>
-            <a:xfrm flipH="false" flipV="false" rot="0">
+            <a:xfrm>
               <a:off x="0" y="0"/>
               <a:ext cx="6350000" cy="6339840"/>
             </a:xfrm>
@@ -4886,9 +4837,9 @@
               <a:gdLst/>
               <a:ahLst/>
               <a:cxnLst/>
-              <a:rect r="r" b="b" t="t" l="l"/>
+              <a:rect l="l" t="t" r="r" b="b"/>
               <a:pathLst>
-                <a:path h="6339840" w="6350000">
+                <a:path w="6350000" h="6339840">
                   <a:moveTo>
                     <a:pt x="6350000" y="6339840"/>
                   </a:moveTo>
@@ -4913,12 +4864,12 @@
       </p:grpSp>
       <p:sp>
         <p:nvSpPr>
-          <p:cNvPr name="Freeform 4" id="4"/>
+          <p:cNvPr id="4" name="Freeform 4"/>
           <p:cNvSpPr/>
           <p:nvPr/>
         </p:nvSpPr>
         <p:spPr>
-          <a:xfrm flipH="false" flipV="false" rot="0">
+          <a:xfrm>
             <a:off x="9791303" y="3724175"/>
             <a:ext cx="7467997" cy="2838650"/>
           </a:xfrm>
@@ -4927,9 +4878,9 @@
             <a:gdLst/>
             <a:ahLst/>
             <a:cxnLst/>
-            <a:rect r="r" b="b" t="t" l="l"/>
+            <a:rect l="l" t="t" r="r" b="b"/>
             <a:pathLst>
-              <a:path h="2838650" w="7467997">
+              <a:path w="7467997" h="2838650">
                 <a:moveTo>
                   <a:pt x="0" y="0"/>
                 </a:moveTo>
@@ -4952,19 +4903,19 @@
           <a:blipFill>
             <a:blip r:embed="rId2"/>
             <a:stretch>
-              <a:fillRect l="0" t="-7733" r="0" b="-441"/>
+              <a:fillRect t="-7733" b="-441"/>
             </a:stretch>
           </a:blipFill>
         </p:spPr>
       </p:sp>
       <p:sp>
         <p:nvSpPr>
-          <p:cNvPr name="TextBox 5" id="5"/>
-          <p:cNvSpPr txBox="true"/>
+          <p:cNvPr id="5" name="TextBox 5"/>
+          <p:cNvSpPr txBox="1"/>
           <p:nvPr/>
         </p:nvSpPr>
         <p:spPr>
-          <a:xfrm rot="0">
+          <a:xfrm>
             <a:off x="4716086" y="379832"/>
             <a:ext cx="8855829" cy="895350"/>
           </a:xfrm>
@@ -4973,7 +4924,7 @@
           </a:prstGeom>
         </p:spPr>
         <p:txBody>
-          <a:bodyPr anchor="t" rtlCol="false" tIns="0" lIns="0" bIns="0" rIns="0">
+          <a:bodyPr lIns="0" tIns="0" rIns="0" bIns="0" rtlCol="0" anchor="t">
             <a:spAutoFit/>
           </a:bodyPr>
           <a:lstStyle/>
@@ -4997,12 +4948,12 @@
       </p:sp>
       <p:sp>
         <p:nvSpPr>
-          <p:cNvPr name="TextBox 6" id="6"/>
-          <p:cNvSpPr txBox="true"/>
+          <p:cNvPr id="6" name="TextBox 6"/>
+          <p:cNvSpPr txBox="1"/>
           <p:nvPr/>
         </p:nvSpPr>
         <p:spPr>
-          <a:xfrm rot="0">
+          <a:xfrm>
             <a:off x="0" y="2818804"/>
             <a:ext cx="8460754" cy="5559425"/>
           </a:xfrm>
@@ -5011,12 +4962,12 @@
           </a:prstGeom>
         </p:spPr>
         <p:txBody>
-          <a:bodyPr anchor="t" rtlCol="false" tIns="0" lIns="0" bIns="0" rIns="0">
+          <a:bodyPr lIns="0" tIns="0" rIns="0" bIns="0" rtlCol="0" anchor="t">
             <a:spAutoFit/>
           </a:bodyPr>
           <a:lstStyle/>
           <a:p>
-            <a:pPr algn="just" marL="755651" indent="-377825" lvl="1">
+            <a:pPr marL="755651" lvl="1" indent="-377825" algn="just">
               <a:lnSpc>
                 <a:spcPts val="4900"/>
               </a:lnSpc>
@@ -5034,7 +4985,7 @@
             </a:r>
           </a:p>
           <a:p>
-            <a:pPr algn="just" marL="755651" indent="-377825" lvl="1">
+            <a:pPr marL="755651" lvl="1" indent="-377825" algn="just">
               <a:lnSpc>
                 <a:spcPts val="4900"/>
               </a:lnSpc>
@@ -5062,7 +5013,7 @@
 </file>
 
 <file path=ppt/slides/slide5.xml><?xml version="1.0" encoding="utf-8"?>
-<p:sld xmlns:p="http://schemas.openxmlformats.org/presentationml/2006/main" xmlns:a="http://schemas.openxmlformats.org/drawingml/2006/main" xmlns:r="http://schemas.openxmlformats.org/officeDocument/2006/relationships">
+<p:sld xmlns:a="http://schemas.openxmlformats.org/drawingml/2006/main" xmlns:r="http://schemas.openxmlformats.org/officeDocument/2006/relationships" xmlns:p="http://schemas.openxmlformats.org/presentationml/2006/main">
   <p:cSld>
     <p:spTree>
       <p:nvGrpSpPr>
@@ -5080,7 +5031,7 @@
       </p:grpSpPr>
       <p:grpSp>
         <p:nvGrpSpPr>
-          <p:cNvPr name="Group 2" id="2"/>
+          <p:cNvPr id="2" name="Group 2"/>
           <p:cNvGrpSpPr/>
           <p:nvPr/>
         </p:nvGrpSpPr>
@@ -5094,12 +5045,12 @@
         </p:grpSpPr>
         <p:sp>
           <p:nvSpPr>
-            <p:cNvPr name="Freeform 3" id="3"/>
+            <p:cNvPr id="3" name="Freeform 3"/>
             <p:cNvSpPr/>
             <p:nvPr/>
           </p:nvSpPr>
           <p:spPr>
-            <a:xfrm flipH="false" flipV="false" rot="0">
+            <a:xfrm>
               <a:off x="0" y="0"/>
               <a:ext cx="6350000" cy="6339840"/>
             </a:xfrm>
@@ -5108,9 +5059,9 @@
               <a:gdLst/>
               <a:ahLst/>
               <a:cxnLst/>
-              <a:rect r="r" b="b" t="t" l="l"/>
+              <a:rect l="l" t="t" r="r" b="b"/>
               <a:pathLst>
-                <a:path h="6339840" w="6350000">
+                <a:path w="6350000" h="6339840">
                   <a:moveTo>
                     <a:pt x="6350000" y="6339840"/>
                   </a:moveTo>
@@ -5135,12 +5086,12 @@
       </p:grpSp>
       <p:sp>
         <p:nvSpPr>
-          <p:cNvPr name="Freeform 4" id="4"/>
+          <p:cNvPr id="4" name="Freeform 4"/>
           <p:cNvSpPr/>
           <p:nvPr/>
         </p:nvSpPr>
         <p:spPr>
-          <a:xfrm flipH="false" flipV="false" rot="0">
+          <a:xfrm>
             <a:off x="7557663" y="1885084"/>
             <a:ext cx="9372327" cy="6516832"/>
           </a:xfrm>
@@ -5149,9 +5100,9 @@
             <a:gdLst/>
             <a:ahLst/>
             <a:cxnLst/>
-            <a:rect r="r" b="b" t="t" l="l"/>
+            <a:rect l="l" t="t" r="r" b="b"/>
             <a:pathLst>
-              <a:path h="6516832" w="9372327">
+              <a:path w="9372327" h="6516832">
                 <a:moveTo>
                   <a:pt x="0" y="0"/>
                 </a:moveTo>
@@ -5174,19 +5125,19 @@
           <a:blipFill>
             <a:blip r:embed="rId2"/>
             <a:stretch>
-              <a:fillRect l="-347" t="0" r="-347" b="0"/>
+              <a:fillRect l="-347" r="-347"/>
             </a:stretch>
           </a:blipFill>
         </p:spPr>
       </p:sp>
       <p:sp>
         <p:nvSpPr>
-          <p:cNvPr name="TextBox 5" id="5"/>
-          <p:cNvSpPr txBox="true"/>
+          <p:cNvPr id="5" name="TextBox 5"/>
+          <p:cNvSpPr txBox="1"/>
           <p:nvPr/>
         </p:nvSpPr>
         <p:spPr>
-          <a:xfrm rot="0">
+          <a:xfrm>
             <a:off x="0" y="2016125"/>
             <a:ext cx="7086411" cy="6178550"/>
           </a:xfrm>
@@ -5195,12 +5146,12 @@
           </a:prstGeom>
         </p:spPr>
         <p:txBody>
-          <a:bodyPr anchor="t" rtlCol="false" tIns="0" lIns="0" bIns="0" rIns="0">
+          <a:bodyPr lIns="0" tIns="0" rIns="0" bIns="0" rtlCol="0" anchor="t">
             <a:spAutoFit/>
           </a:bodyPr>
           <a:lstStyle/>
           <a:p>
-            <a:pPr algn="just" marL="755651" indent="-377825" lvl="1">
+            <a:pPr marL="755651" lvl="1" indent="-377825" algn="just">
               <a:lnSpc>
                 <a:spcPts val="4900"/>
               </a:lnSpc>
@@ -5218,7 +5169,7 @@
             </a:r>
           </a:p>
           <a:p>
-            <a:pPr algn="just" marL="755651" indent="-377825" lvl="1">
+            <a:pPr marL="755651" lvl="1" indent="-377825" algn="just">
               <a:lnSpc>
                 <a:spcPts val="4900"/>
               </a:lnSpc>
@@ -5246,7 +5197,7 @@
 </file>
 
 <file path=ppt/slides/slide6.xml><?xml version="1.0" encoding="utf-8"?>
-<p:sld xmlns:p="http://schemas.openxmlformats.org/presentationml/2006/main" xmlns:a="http://schemas.openxmlformats.org/drawingml/2006/main" xmlns:r="http://schemas.openxmlformats.org/officeDocument/2006/relationships">
+<p:sld xmlns:a="http://schemas.openxmlformats.org/drawingml/2006/main" xmlns:r="http://schemas.openxmlformats.org/officeDocument/2006/relationships" xmlns:p="http://schemas.openxmlformats.org/presentationml/2006/main">
   <p:cSld>
     <p:spTree>
       <p:nvGrpSpPr>
@@ -5264,7 +5215,7 @@
       </p:grpSpPr>
       <p:grpSp>
         <p:nvGrpSpPr>
-          <p:cNvPr name="Group 2" id="2"/>
+          <p:cNvPr id="2" name="Group 2"/>
           <p:cNvGrpSpPr/>
           <p:nvPr/>
         </p:nvGrpSpPr>
@@ -5278,12 +5229,12 @@
         </p:grpSpPr>
         <p:sp>
           <p:nvSpPr>
-            <p:cNvPr name="Freeform 3" id="3"/>
+            <p:cNvPr id="3" name="Freeform 3"/>
             <p:cNvSpPr/>
             <p:nvPr/>
           </p:nvSpPr>
           <p:spPr>
-            <a:xfrm flipH="false" flipV="false" rot="0">
+            <a:xfrm>
               <a:off x="0" y="0"/>
               <a:ext cx="1913890" cy="1913890"/>
             </a:xfrm>
@@ -5292,9 +5243,9 @@
               <a:gdLst/>
               <a:ahLst/>
               <a:cxnLst/>
-              <a:rect r="r" b="b" t="t" l="l"/>
+              <a:rect l="l" t="t" r="r" b="b"/>
               <a:pathLst>
-                <a:path h="1913890" w="1913890">
+                <a:path w="1913890" h="1913890">
                   <a:moveTo>
                     <a:pt x="0" y="0"/>
                   </a:moveTo>
@@ -5319,7 +5270,7 @@
       </p:grpSp>
       <p:grpSp>
         <p:nvGrpSpPr>
-          <p:cNvPr name="Group 4" id="4"/>
+          <p:cNvPr id="4" name="Group 4"/>
           <p:cNvGrpSpPr/>
           <p:nvPr/>
         </p:nvGrpSpPr>
@@ -5333,12 +5284,12 @@
         </p:grpSpPr>
         <p:sp>
           <p:nvSpPr>
-            <p:cNvPr name="Freeform 5" id="5"/>
+            <p:cNvPr id="5" name="Freeform 5"/>
             <p:cNvSpPr/>
             <p:nvPr/>
           </p:nvSpPr>
           <p:spPr>
-            <a:xfrm flipH="false" flipV="false" rot="0">
+            <a:xfrm>
               <a:off x="0" y="0"/>
               <a:ext cx="1913890" cy="1913890"/>
             </a:xfrm>
@@ -5347,9 +5298,9 @@
               <a:gdLst/>
               <a:ahLst/>
               <a:cxnLst/>
-              <a:rect r="r" b="b" t="t" l="l"/>
+              <a:rect l="l" t="t" r="r" b="b"/>
               <a:pathLst>
-                <a:path h="1913890" w="1913890">
+                <a:path w="1913890" h="1913890">
                   <a:moveTo>
                     <a:pt x="0" y="0"/>
                   </a:moveTo>
@@ -5393,7 +5344,7 @@
       </p:grpSp>
       <p:grpSp>
         <p:nvGrpSpPr>
-          <p:cNvPr name="Group 6" id="6"/>
+          <p:cNvPr id="6" name="Group 6"/>
           <p:cNvGrpSpPr/>
           <p:nvPr/>
         </p:nvGrpSpPr>
@@ -5407,12 +5358,12 @@
         </p:grpSpPr>
         <p:sp>
           <p:nvSpPr>
-            <p:cNvPr name="Freeform 7" id="7"/>
+            <p:cNvPr id="7" name="Freeform 7"/>
             <p:cNvSpPr/>
             <p:nvPr/>
           </p:nvSpPr>
           <p:spPr>
-            <a:xfrm flipH="false" flipV="false" rot="0">
+            <a:xfrm>
               <a:off x="0" y="0"/>
               <a:ext cx="6350000" cy="6339840"/>
             </a:xfrm>
@@ -5421,9 +5372,9 @@
               <a:gdLst/>
               <a:ahLst/>
               <a:cxnLst/>
-              <a:rect r="r" b="b" t="t" l="l"/>
+              <a:rect l="l" t="t" r="r" b="b"/>
               <a:pathLst>
-                <a:path h="6339840" w="6350000">
+                <a:path w="6350000" h="6339840">
                   <a:moveTo>
                     <a:pt x="6350000" y="6339840"/>
                   </a:moveTo>
@@ -5448,12 +5399,12 @@
       </p:grpSp>
       <p:sp>
         <p:nvSpPr>
-          <p:cNvPr name="TextBox 8" id="8"/>
-          <p:cNvSpPr txBox="true"/>
+          <p:cNvPr id="8" name="TextBox 8"/>
+          <p:cNvSpPr txBox="1"/>
           <p:nvPr/>
         </p:nvSpPr>
         <p:spPr>
-          <a:xfrm rot="0">
+          <a:xfrm>
             <a:off x="1028700" y="1559764"/>
             <a:ext cx="6572781" cy="606425"/>
           </a:xfrm>
@@ -5462,7 +5413,7 @@
           </a:prstGeom>
         </p:spPr>
         <p:txBody>
-          <a:bodyPr anchor="t" rtlCol="false" tIns="0" lIns="0" bIns="0" rIns="0">
+          <a:bodyPr lIns="0" tIns="0" rIns="0" bIns="0" rtlCol="0" anchor="t">
             <a:spAutoFit/>
           </a:bodyPr>
           <a:lstStyle/>
@@ -5486,12 +5437,12 @@
       </p:sp>
       <p:sp>
         <p:nvSpPr>
-          <p:cNvPr name="Freeform 9" id="9"/>
+          <p:cNvPr id="9" name="Freeform 9"/>
           <p:cNvSpPr/>
           <p:nvPr/>
         </p:nvSpPr>
         <p:spPr>
-          <a:xfrm flipH="false" flipV="false" rot="0">
+          <a:xfrm>
             <a:off x="8631172" y="1901076"/>
             <a:ext cx="3890712" cy="7013376"/>
           </a:xfrm>
@@ -5500,9 +5451,9 @@
             <a:gdLst/>
             <a:ahLst/>
             <a:cxnLst/>
-            <a:rect r="r" b="b" t="t" l="l"/>
+            <a:rect l="l" t="t" r="r" b="b"/>
             <a:pathLst>
-              <a:path h="7013376" w="3890712">
+              <a:path w="3890712" h="7013376">
                 <a:moveTo>
                   <a:pt x="0" y="0"/>
                 </a:moveTo>
@@ -5525,33 +5476,33 @@
           <a:blipFill>
             <a:blip r:embed="rId2"/>
             <a:stretch>
-              <a:fillRect l="0" t="0" r="-11589" b="0"/>
+              <a:fillRect r="-11589"/>
             </a:stretch>
           </a:blipFill>
         </p:spPr>
       </p:sp>
       <p:sp>
         <p:nvSpPr>
-          <p:cNvPr name="TextBox 10" id="10"/>
-          <p:cNvSpPr txBox="true"/>
+          <p:cNvPr id="10" name="TextBox 10"/>
+          <p:cNvSpPr txBox="1"/>
           <p:nvPr/>
         </p:nvSpPr>
         <p:spPr>
-          <a:xfrm rot="0">
+          <a:xfrm>
             <a:off x="641455" y="2678257"/>
-            <a:ext cx="7237994" cy="3027113"/>
+            <a:ext cx="7469907" cy="4247830"/>
           </a:xfrm>
           <a:prstGeom prst="rect">
             <a:avLst/>
           </a:prstGeom>
         </p:spPr>
         <p:txBody>
-          <a:bodyPr anchor="t" rtlCol="false" tIns="0" lIns="0" bIns="0" rIns="0">
+          <a:bodyPr wrap="square" lIns="0" tIns="0" rIns="0" bIns="0" rtlCol="0" anchor="t">
             <a:spAutoFit/>
           </a:bodyPr>
           <a:lstStyle/>
           <a:p>
-            <a:pPr algn="just" marL="744277" indent="-372138" lvl="1">
+            <a:pPr marL="744220" lvl="1" indent="-372110" algn="just">
               <a:lnSpc>
                 <a:spcPts val="4826"/>
               </a:lnSpc>
@@ -5559,13 +5510,284 @@
               <a:buChar char="•"/>
             </a:pPr>
             <a:r>
-              <a:rPr lang="en-US" sz="3447" spc="344">
+              <a:rPr lang="en-US" sz="3400" spc="344" dirty="0">
                 <a:solidFill>
                   <a:srgbClr val="000000"/>
                 </a:solidFill>
                 <a:latin typeface="Lato"/>
               </a:rPr>
-              <a:t>Agora temos dois botões disponíveis na tela, um para incrementar o contador e outro para decrementá-lo.</a:t>
+              <a:t>Agora </a:t>
+            </a:r>
+            <a:r>
+              <a:rPr lang="en-US" sz="3400" spc="344" dirty="0" err="1">
+                <a:solidFill>
+                  <a:srgbClr val="000000"/>
+                </a:solidFill>
+                <a:latin typeface="Lato"/>
+              </a:rPr>
+              <a:t>temos</a:t>
+            </a:r>
+            <a:r>
+              <a:rPr lang="en-US" sz="3400" spc="344" dirty="0">
+                <a:solidFill>
+                  <a:srgbClr val="000000"/>
+                </a:solidFill>
+                <a:latin typeface="Lato"/>
+              </a:rPr>
+              <a:t> </a:t>
+            </a:r>
+            <a:r>
+              <a:rPr lang="en-US" sz="3400" spc="344" dirty="0" err="1">
+                <a:solidFill>
+                  <a:srgbClr val="000000"/>
+                </a:solidFill>
+                <a:latin typeface="Lato"/>
+              </a:rPr>
+              <a:t>dois</a:t>
+            </a:r>
+            <a:r>
+              <a:rPr lang="en-US" sz="3400" spc="344" dirty="0">
+                <a:solidFill>
+                  <a:srgbClr val="000000"/>
+                </a:solidFill>
+                <a:latin typeface="Lato"/>
+              </a:rPr>
+              <a:t> </a:t>
+            </a:r>
+            <a:r>
+              <a:rPr lang="en-US" sz="3400" spc="344" dirty="0" err="1">
+                <a:solidFill>
+                  <a:srgbClr val="000000"/>
+                </a:solidFill>
+                <a:latin typeface="Lato"/>
+              </a:rPr>
+              <a:t>botões</a:t>
+            </a:r>
+            <a:r>
+              <a:rPr lang="en-US" sz="3400" spc="344" dirty="0">
+                <a:solidFill>
+                  <a:srgbClr val="000000"/>
+                </a:solidFill>
+                <a:latin typeface="Lato"/>
+              </a:rPr>
+              <a:t> </a:t>
+            </a:r>
+            <a:r>
+              <a:rPr lang="en-US" sz="3400" spc="344" dirty="0" err="1">
+                <a:solidFill>
+                  <a:srgbClr val="000000"/>
+                </a:solidFill>
+                <a:latin typeface="Lato"/>
+              </a:rPr>
+              <a:t>disponíveis</a:t>
+            </a:r>
+            <a:r>
+              <a:rPr lang="en-US" sz="3400" spc="344" dirty="0">
+                <a:solidFill>
+                  <a:srgbClr val="000000"/>
+                </a:solidFill>
+                <a:latin typeface="Lato"/>
+              </a:rPr>
+              <a:t> </a:t>
+            </a:r>
+            <a:r>
+              <a:rPr lang="en-US" sz="3400" spc="344" dirty="0" err="1">
+                <a:solidFill>
+                  <a:srgbClr val="000000"/>
+                </a:solidFill>
+                <a:latin typeface="Lato"/>
+              </a:rPr>
+              <a:t>na</a:t>
+            </a:r>
+            <a:r>
+              <a:rPr lang="en-US" sz="3400" spc="344" dirty="0">
+                <a:solidFill>
+                  <a:srgbClr val="000000"/>
+                </a:solidFill>
+                <a:latin typeface="Lato"/>
+              </a:rPr>
+              <a:t> </a:t>
+            </a:r>
+            <a:r>
+              <a:rPr lang="en-US" sz="3400" spc="344" dirty="0" err="1">
+                <a:solidFill>
+                  <a:srgbClr val="000000"/>
+                </a:solidFill>
+                <a:latin typeface="Lato"/>
+              </a:rPr>
+              <a:t>tela</a:t>
+            </a:r>
+            <a:r>
+              <a:rPr lang="en-US" sz="3400" spc="344" dirty="0">
+                <a:solidFill>
+                  <a:srgbClr val="000000"/>
+                </a:solidFill>
+                <a:latin typeface="Lato"/>
+              </a:rPr>
+              <a:t>, um para </a:t>
+            </a:r>
+            <a:r>
+              <a:rPr lang="en-US" sz="3400" spc="344" dirty="0" err="1">
+                <a:solidFill>
+                  <a:srgbClr val="000000"/>
+                </a:solidFill>
+                <a:latin typeface="Lato"/>
+              </a:rPr>
+              <a:t>incrementar</a:t>
+            </a:r>
+            <a:r>
+              <a:rPr lang="en-US" sz="3400" spc="344" dirty="0">
+                <a:solidFill>
+                  <a:srgbClr val="000000"/>
+                </a:solidFill>
+                <a:latin typeface="Lato"/>
+              </a:rPr>
+              <a:t> o </a:t>
+            </a:r>
+            <a:r>
+              <a:rPr lang="en-US" sz="3400" spc="344" dirty="0" err="1">
+                <a:solidFill>
+                  <a:srgbClr val="000000"/>
+                </a:solidFill>
+                <a:latin typeface="Lato"/>
+              </a:rPr>
+              <a:t>contador</a:t>
+            </a:r>
+            <a:r>
+              <a:rPr lang="en-US" sz="3400" spc="344" dirty="0">
+                <a:solidFill>
+                  <a:srgbClr val="000000"/>
+                </a:solidFill>
+                <a:latin typeface="Lato"/>
+              </a:rPr>
+              <a:t> e outro para </a:t>
+            </a:r>
+            <a:r>
+              <a:rPr lang="en-US" sz="3400" spc="344" dirty="0" err="1">
+                <a:solidFill>
+                  <a:srgbClr val="000000"/>
+                </a:solidFill>
+                <a:latin typeface="Lato"/>
+              </a:rPr>
+              <a:t>decrementá</a:t>
+            </a:r>
+            <a:r>
+              <a:rPr lang="en-US" sz="3400" spc="344" dirty="0">
+                <a:solidFill>
+                  <a:srgbClr val="000000"/>
+                </a:solidFill>
+                <a:latin typeface="Lato"/>
+              </a:rPr>
+              <a:t>-lo.</a:t>
+            </a:r>
+            <a:endParaRPr lang="pt-BR" sz="3400" dirty="0"/>
+          </a:p>
+          <a:p>
+            <a:pPr marL="744220" lvl="1" indent="-372110" algn="just">
+              <a:lnSpc>
+                <a:spcPts val="4826"/>
+              </a:lnSpc>
+              <a:buFont typeface="Arial"/>
+              <a:buChar char="•"/>
+            </a:pPr>
+            <a:r>
+              <a:rPr lang="en-US" sz="3400" spc="344" dirty="0" err="1">
+                <a:solidFill>
+                  <a:srgbClr val="000000"/>
+                </a:solidFill>
+                <a:latin typeface="Lato"/>
+                <a:ea typeface="Lato"/>
+                <a:cs typeface="Lato"/>
+              </a:rPr>
+              <a:t>Acesse</a:t>
+            </a:r>
+            <a:r>
+              <a:rPr lang="en-US" sz="3400" spc="344" dirty="0">
+                <a:solidFill>
+                  <a:srgbClr val="000000"/>
+                </a:solidFill>
+                <a:latin typeface="Lato"/>
+                <a:ea typeface="Lato"/>
+                <a:cs typeface="Lato"/>
+              </a:rPr>
+              <a:t> o </a:t>
+            </a:r>
+            <a:r>
+              <a:rPr lang="en-US" sz="3400" spc="344" dirty="0" err="1">
+                <a:solidFill>
+                  <a:srgbClr val="000000"/>
+                </a:solidFill>
+                <a:latin typeface="Lato"/>
+                <a:ea typeface="Lato"/>
+                <a:cs typeface="Lato"/>
+              </a:rPr>
+              <a:t>código</a:t>
+            </a:r>
+            <a:r>
+              <a:rPr lang="en-US" sz="3400" spc="344" dirty="0">
+                <a:solidFill>
+                  <a:srgbClr val="000000"/>
+                </a:solidFill>
+                <a:latin typeface="Lato"/>
+                <a:ea typeface="Lato"/>
+                <a:cs typeface="Lato"/>
+              </a:rPr>
+              <a:t> </a:t>
+            </a:r>
+            <a:r>
+              <a:rPr lang="en-US" sz="3400" spc="344" dirty="0" err="1">
+                <a:solidFill>
+                  <a:srgbClr val="000000"/>
+                </a:solidFill>
+                <a:latin typeface="Lato"/>
+                <a:ea typeface="Lato"/>
+                <a:cs typeface="Lato"/>
+              </a:rPr>
+              <a:t>completo</a:t>
+            </a:r>
+            <a:r>
+              <a:rPr lang="en-US" sz="3400" spc="344" dirty="0">
+                <a:solidFill>
+                  <a:srgbClr val="000000"/>
+                </a:solidFill>
+                <a:latin typeface="Lato"/>
+                <a:ea typeface="Lato"/>
+                <a:cs typeface="Lato"/>
+              </a:rPr>
+              <a:t> no </a:t>
+            </a:r>
+            <a:r>
+              <a:rPr lang="en-US" sz="3400" spc="344" dirty="0" err="1">
+                <a:solidFill>
+                  <a:srgbClr val="000000"/>
+                </a:solidFill>
+                <a:latin typeface="Lato"/>
+                <a:ea typeface="Lato"/>
+                <a:cs typeface="Lato"/>
+              </a:rPr>
+              <a:t>arquivo</a:t>
+            </a:r>
+            <a:r>
+              <a:rPr lang="en-US" sz="3400" spc="344" dirty="0">
+                <a:solidFill>
+                  <a:srgbClr val="000000"/>
+                </a:solidFill>
+                <a:latin typeface="Lato"/>
+                <a:ea typeface="Lato"/>
+                <a:cs typeface="Lato"/>
+              </a:rPr>
+              <a:t> </a:t>
+            </a:r>
+            <a:r>
+              <a:rPr lang="en-US" sz="3400" spc="344" dirty="0" err="1">
+                <a:solidFill>
+                  <a:srgbClr val="000000"/>
+                </a:solidFill>
+                <a:latin typeface="Lato"/>
+                <a:ea typeface="Lato"/>
+                <a:cs typeface="Lato"/>
+              </a:rPr>
+              <a:t>criandoBotoes.dart</a:t>
             </a:r>
           </a:p>
         </p:txBody>
@@ -5579,7 +5801,7 @@
 </file>
 
 <file path=ppt/slides/slide7.xml><?xml version="1.0" encoding="utf-8"?>
-<p:sld xmlns:p="http://schemas.openxmlformats.org/presentationml/2006/main" xmlns:a="http://schemas.openxmlformats.org/drawingml/2006/main" xmlns:r="http://schemas.openxmlformats.org/officeDocument/2006/relationships">
+<p:sld xmlns:a="http://schemas.openxmlformats.org/drawingml/2006/main" xmlns:r="http://schemas.openxmlformats.org/officeDocument/2006/relationships" xmlns:p="http://schemas.openxmlformats.org/presentationml/2006/main">
   <p:cSld>
     <p:spTree>
       <p:nvGrpSpPr>
@@ -5597,7 +5819,7 @@
       </p:grpSpPr>
       <p:grpSp>
         <p:nvGrpSpPr>
-          <p:cNvPr name="Group 2" id="2"/>
+          <p:cNvPr id="2" name="Group 2"/>
           <p:cNvGrpSpPr/>
           <p:nvPr/>
         </p:nvGrpSpPr>
@@ -5611,12 +5833,12 @@
         </p:grpSpPr>
         <p:sp>
           <p:nvSpPr>
-            <p:cNvPr name="Freeform 3" id="3"/>
+            <p:cNvPr id="3" name="Freeform 3"/>
             <p:cNvSpPr/>
             <p:nvPr/>
           </p:nvSpPr>
           <p:spPr>
-            <a:xfrm flipH="false" flipV="false" rot="0">
+            <a:xfrm>
               <a:off x="0" y="0"/>
               <a:ext cx="6350000" cy="6339840"/>
             </a:xfrm>
@@ -5625,9 +5847,9 @@
               <a:gdLst/>
               <a:ahLst/>
               <a:cxnLst/>
-              <a:rect r="r" b="b" t="t" l="l"/>
+              <a:rect l="l" t="t" r="r" b="b"/>
               <a:pathLst>
-                <a:path h="6339840" w="6350000">
+                <a:path w="6350000" h="6339840">
                   <a:moveTo>
                     <a:pt x="6350000" y="6339840"/>
                   </a:moveTo>
@@ -5652,12 +5874,12 @@
       </p:grpSp>
       <p:sp>
         <p:nvSpPr>
-          <p:cNvPr name="Freeform 4" id="4"/>
+          <p:cNvPr id="4" name="Freeform 4"/>
           <p:cNvSpPr/>
           <p:nvPr/>
         </p:nvSpPr>
         <p:spPr>
-          <a:xfrm flipH="false" flipV="false" rot="0">
+          <a:xfrm>
             <a:off x="9290821" y="1902431"/>
             <a:ext cx="3857536" cy="6965608"/>
           </a:xfrm>
@@ -5666,9 +5888,9 @@
             <a:gdLst/>
             <a:ahLst/>
             <a:cxnLst/>
-            <a:rect r="r" b="b" t="t" l="l"/>
+            <a:rect l="l" t="t" r="r" b="b"/>
             <a:pathLst>
-              <a:path h="6965608" w="3857536">
+              <a:path w="3857536" h="6965608">
                 <a:moveTo>
                   <a:pt x="0" y="0"/>
                 </a:moveTo>
@@ -5691,19 +5913,19 @@
           <a:blipFill>
             <a:blip r:embed="rId2"/>
             <a:stretch>
-              <a:fillRect l="0" t="0" r="0" b="0"/>
+              <a:fillRect/>
             </a:stretch>
           </a:blipFill>
         </p:spPr>
       </p:sp>
       <p:sp>
         <p:nvSpPr>
-          <p:cNvPr name="Freeform 5" id="5"/>
+          <p:cNvPr id="5" name="Freeform 5"/>
           <p:cNvSpPr/>
           <p:nvPr/>
         </p:nvSpPr>
         <p:spPr>
-          <a:xfrm flipH="false" flipV="false" rot="0">
+          <a:xfrm>
             <a:off x="13571914" y="1902431"/>
             <a:ext cx="3883885" cy="6965608"/>
           </a:xfrm>
@@ -5712,9 +5934,9 @@
             <a:gdLst/>
             <a:ahLst/>
             <a:cxnLst/>
-            <a:rect r="r" b="b" t="t" l="l"/>
+            <a:rect l="l" t="t" r="r" b="b"/>
             <a:pathLst>
-              <a:path h="6965608" w="3883885">
+              <a:path w="3883885" h="6965608">
                 <a:moveTo>
                   <a:pt x="0" y="0"/>
                 </a:moveTo>
@@ -5737,19 +5959,19 @@
           <a:blipFill>
             <a:blip r:embed="rId3"/>
             <a:stretch>
-              <a:fillRect l="-1283" t="-1096" r="-1223" b="0"/>
+              <a:fillRect l="-1283" t="-1096" r="-1223"/>
             </a:stretch>
           </a:blipFill>
         </p:spPr>
       </p:sp>
       <p:sp>
         <p:nvSpPr>
-          <p:cNvPr name="TextBox 6" id="6"/>
-          <p:cNvSpPr txBox="true"/>
+          <p:cNvPr id="6" name="TextBox 6"/>
+          <p:cNvSpPr txBox="1"/>
           <p:nvPr/>
         </p:nvSpPr>
         <p:spPr>
-          <a:xfrm rot="0">
+          <a:xfrm>
             <a:off x="4716086" y="379832"/>
             <a:ext cx="8855829" cy="895350"/>
           </a:xfrm>
@@ -5758,7 +5980,7 @@
           </a:prstGeom>
         </p:spPr>
         <p:txBody>
-          <a:bodyPr anchor="t" rtlCol="false" tIns="0" lIns="0" bIns="0" rIns="0">
+          <a:bodyPr lIns="0" tIns="0" rIns="0" bIns="0" rtlCol="0" anchor="t">
             <a:spAutoFit/>
           </a:bodyPr>
           <a:lstStyle/>
@@ -5782,26 +6004,26 @@
       </p:sp>
       <p:sp>
         <p:nvSpPr>
-          <p:cNvPr name="TextBox 7" id="7"/>
-          <p:cNvSpPr txBox="true"/>
+          <p:cNvPr id="7" name="TextBox 7"/>
+          <p:cNvSpPr txBox="1"/>
           <p:nvPr/>
         </p:nvSpPr>
         <p:spPr>
-          <a:xfrm rot="0">
+          <a:xfrm>
             <a:off x="4458" y="2552463"/>
-            <a:ext cx="8867263" cy="5191599"/>
+            <a:ext cx="8867263" cy="4744889"/>
           </a:xfrm>
           <a:prstGeom prst="rect">
             <a:avLst/>
           </a:prstGeom>
         </p:spPr>
         <p:txBody>
-          <a:bodyPr anchor="t" rtlCol="false" tIns="0" lIns="0" bIns="0" rIns="0">
+          <a:bodyPr lIns="0" tIns="0" rIns="0" bIns="0" rtlCol="0" anchor="t">
             <a:spAutoFit/>
           </a:bodyPr>
           <a:lstStyle/>
           <a:p>
-            <a:pPr algn="just" marL="761020" indent="-380510" lvl="1">
+            <a:pPr marL="760730" lvl="1" indent="-380365" algn="just">
               <a:lnSpc>
                 <a:spcPts val="3701"/>
               </a:lnSpc>
@@ -5809,27 +6031,136 @@
               <a:buChar char="•"/>
             </a:pPr>
             <a:r>
-              <a:rPr lang="en-US" sz="3524" spc="176">
+              <a:rPr lang="en-US" sz="3300" spc="176" dirty="0">
                 <a:solidFill>
                   <a:srgbClr val="000000"/>
                 </a:solidFill>
                 <a:latin typeface="Poppins"/>
               </a:rPr>
-              <a:t>Agora substitua o código existente por esse: </a:t>
-            </a:r>
-            <a:r>
-              <a:rPr lang="en-US" sz="3524" spc="176" u="sng">
-                <a:solidFill>
-                  <a:srgbClr val="2B4A9D"/>
+              <a:t>Agora </a:t>
+            </a:r>
+            <a:r>
+              <a:rPr lang="en-US" sz="3300" spc="176" dirty="0" err="1">
+                <a:solidFill>
+                  <a:srgbClr val="000000"/>
                 </a:solidFill>
                 <a:latin typeface="Poppins"/>
-                <a:hlinkClick r:id="rId4" tooltip="https://github.com/marcosdosea/TreinamentoFlutter/blob/main/Aula04-Entrada%20de%20Dados%20e%20Bot%C3%B5es/entradaDados.dart"/>
-              </a:rPr>
-              <a:t>Clique aqui</a:t>
-            </a:r>
-          </a:p>
-          <a:p>
-            <a:pPr algn="just" marL="761020" indent="-380510" lvl="1">
+              </a:rPr>
+              <a:t>substitua</a:t>
+            </a:r>
+            <a:r>
+              <a:rPr lang="en-US" sz="3300" spc="176" dirty="0">
+                <a:solidFill>
+                  <a:srgbClr val="000000"/>
+                </a:solidFill>
+                <a:latin typeface="Poppins"/>
+              </a:rPr>
+              <a:t> o </a:t>
+            </a:r>
+            <a:r>
+              <a:rPr lang="en-US" sz="3300" spc="176" dirty="0" err="1">
+                <a:solidFill>
+                  <a:srgbClr val="000000"/>
+                </a:solidFill>
+                <a:latin typeface="Poppins"/>
+              </a:rPr>
+              <a:t>código</a:t>
+            </a:r>
+            <a:r>
+              <a:rPr lang="en-US" sz="3300" spc="176" dirty="0">
+                <a:solidFill>
+                  <a:srgbClr val="000000"/>
+                </a:solidFill>
+                <a:latin typeface="Poppins"/>
+              </a:rPr>
+              <a:t> </a:t>
+            </a:r>
+            <a:r>
+              <a:rPr lang="en-US" sz="3300" spc="176" dirty="0" err="1">
+                <a:solidFill>
+                  <a:srgbClr val="000000"/>
+                </a:solidFill>
+                <a:latin typeface="Poppins"/>
+              </a:rPr>
+              <a:t>existente</a:t>
+            </a:r>
+            <a:r>
+              <a:rPr lang="en-US" sz="3300" spc="176" dirty="0">
+                <a:solidFill>
+                  <a:srgbClr val="000000"/>
+                </a:solidFill>
+                <a:latin typeface="Poppins"/>
+              </a:rPr>
+              <a:t> </a:t>
+            </a:r>
+            <a:r>
+              <a:rPr lang="en-US" sz="3300" spc="176" dirty="0" err="1">
+                <a:solidFill>
+                  <a:srgbClr val="000000"/>
+                </a:solidFill>
+                <a:latin typeface="Poppins"/>
+              </a:rPr>
+              <a:t>por</a:t>
+            </a:r>
+            <a:r>
+              <a:rPr lang="en-US" sz="3300" spc="176" dirty="0">
+                <a:solidFill>
+                  <a:srgbClr val="000000"/>
+                </a:solidFill>
+                <a:latin typeface="Poppins"/>
+              </a:rPr>
+              <a:t> </a:t>
+            </a:r>
+            <a:r>
+              <a:rPr lang="en-US" sz="3300" spc="176" dirty="0" err="1">
+                <a:solidFill>
+                  <a:srgbClr val="000000"/>
+                </a:solidFill>
+                <a:latin typeface="Poppins"/>
+              </a:rPr>
+              <a:t>esse</a:t>
+            </a:r>
+            <a:r>
+              <a:rPr lang="en-US" sz="3300" spc="176" dirty="0">
+                <a:solidFill>
+                  <a:srgbClr val="000000"/>
+                </a:solidFill>
+                <a:latin typeface="Poppins"/>
+              </a:rPr>
+              <a:t>:</a:t>
+            </a:r>
+            <a:r>
+              <a:rPr lang="en-US" sz="3300" spc="176" dirty="0">
+                <a:solidFill>
+                  <a:srgbClr val="000000"/>
+                </a:solidFill>
+                <a:latin typeface="Poppins"/>
+                <a:ea typeface="+mn-lt"/>
+                <a:cs typeface="Poppins"/>
+              </a:rPr>
+              <a:t> </a:t>
+            </a:r>
+            <a:r>
+              <a:rPr lang="en-US" sz="3300" spc="176" dirty="0" err="1">
+                <a:solidFill>
+                  <a:srgbClr val="000000"/>
+                </a:solidFill>
+                <a:latin typeface="Poppins"/>
+                <a:ea typeface="+mn-lt"/>
+                <a:cs typeface="Poppins"/>
+              </a:rPr>
+              <a:t>entradaDados.dart</a:t>
+            </a:r>
+            <a:endParaRPr lang="en-US" sz="3300" u="sng" spc="176" dirty="0">
+              <a:solidFill>
+                <a:srgbClr val="2B4A9D"/>
+              </a:solidFill>
+              <a:latin typeface="Poppins"/>
+              <a:cs typeface="Poppins"/>
+            </a:endParaRPr>
+          </a:p>
+          <a:p>
+            <a:pPr marL="760730" lvl="1" indent="-380365" algn="just">
               <a:lnSpc>
                 <a:spcPts val="3701"/>
               </a:lnSpc>
@@ -5837,17 +6168,222 @@
               <a:buChar char="•"/>
             </a:pPr>
             <a:r>
-              <a:rPr lang="en-US" sz="3524" spc="176">
+              <a:rPr lang="en-US" sz="3300" spc="176" dirty="0">
                 <a:solidFill>
                   <a:srgbClr val="000000"/>
                 </a:solidFill>
                 <a:latin typeface="Poppins"/>
               </a:rPr>
-              <a:t>Neste exemplo, solicitamos que o usuário digite seu nome e exibimos uma mensagem de boas-vindas.</a:t>
-            </a:r>
-          </a:p>
-          <a:p>
-            <a:pPr algn="just" marL="761020" indent="-380510" lvl="1">
+              <a:t>Neste </a:t>
+            </a:r>
+            <a:r>
+              <a:rPr lang="en-US" sz="3300" spc="176" dirty="0" err="1">
+                <a:solidFill>
+                  <a:srgbClr val="000000"/>
+                </a:solidFill>
+                <a:latin typeface="Poppins"/>
+              </a:rPr>
+              <a:t>exemplo</a:t>
+            </a:r>
+            <a:r>
+              <a:rPr lang="en-US" sz="3300" spc="176" dirty="0">
+                <a:solidFill>
+                  <a:srgbClr val="000000"/>
+                </a:solidFill>
+                <a:latin typeface="Poppins"/>
+              </a:rPr>
+              <a:t>, </a:t>
+            </a:r>
+            <a:r>
+              <a:rPr lang="en-US" sz="3300" spc="176" dirty="0" err="1">
+                <a:solidFill>
+                  <a:srgbClr val="000000"/>
+                </a:solidFill>
+                <a:latin typeface="Poppins"/>
+              </a:rPr>
+              <a:t>solicitamos</a:t>
+            </a:r>
+            <a:r>
+              <a:rPr lang="en-US" sz="3300" spc="176" dirty="0">
+                <a:solidFill>
+                  <a:srgbClr val="000000"/>
+                </a:solidFill>
+                <a:latin typeface="Poppins"/>
+              </a:rPr>
+              <a:t> que </a:t>
+            </a:r>
+            <a:r>
+              <a:rPr lang="en-US" sz="3300" spc="176" dirty="0" err="1">
+                <a:solidFill>
+                  <a:srgbClr val="000000"/>
+                </a:solidFill>
+                <a:latin typeface="Poppins"/>
+              </a:rPr>
+              <a:t>o</a:t>
+            </a:r>
+            <a:r>
+              <a:rPr lang="en-US" sz="3300" spc="176" dirty="0">
+                <a:solidFill>
+                  <a:srgbClr val="000000"/>
+                </a:solidFill>
+                <a:latin typeface="Poppins"/>
+              </a:rPr>
+              <a:t> </a:t>
+            </a:r>
+            <a:r>
+              <a:rPr lang="en-US" sz="3300" spc="176" dirty="0" err="1">
+                <a:solidFill>
+                  <a:srgbClr val="000000"/>
+                </a:solidFill>
+                <a:latin typeface="Poppins"/>
+              </a:rPr>
+              <a:t>usuário</a:t>
+            </a:r>
+            <a:r>
+              <a:rPr lang="en-US" sz="3300" spc="176" dirty="0">
+                <a:solidFill>
+                  <a:srgbClr val="000000"/>
+                </a:solidFill>
+                <a:latin typeface="Poppins"/>
+              </a:rPr>
+              <a:t> </a:t>
+            </a:r>
+            <a:r>
+              <a:rPr lang="en-US" sz="3300" spc="176" dirty="0" err="1">
+                <a:solidFill>
+                  <a:srgbClr val="000000"/>
+                </a:solidFill>
+                <a:latin typeface="Poppins"/>
+              </a:rPr>
+              <a:t>digite</a:t>
+            </a:r>
+            <a:r>
+              <a:rPr lang="en-US" sz="3300" spc="176" dirty="0">
+                <a:solidFill>
+                  <a:srgbClr val="000000"/>
+                </a:solidFill>
+                <a:latin typeface="Poppins"/>
+              </a:rPr>
+              <a:t> </a:t>
+            </a:r>
+            <a:r>
+              <a:rPr lang="en-US" sz="3300" spc="176" dirty="0" err="1">
+                <a:solidFill>
+                  <a:srgbClr val="000000"/>
+                </a:solidFill>
+                <a:latin typeface="Poppins"/>
+              </a:rPr>
+              <a:t>seu</a:t>
+            </a:r>
+            <a:r>
+              <a:rPr lang="en-US" sz="3300" spc="176" dirty="0">
+                <a:solidFill>
+                  <a:srgbClr val="000000"/>
+                </a:solidFill>
+                <a:latin typeface="Poppins"/>
+              </a:rPr>
+              <a:t> </a:t>
+            </a:r>
+            <a:r>
+              <a:rPr lang="en-US" sz="3300" spc="176" dirty="0" err="1">
+                <a:solidFill>
+                  <a:srgbClr val="000000"/>
+                </a:solidFill>
+                <a:latin typeface="Poppins"/>
+              </a:rPr>
+              <a:t>nome</a:t>
+            </a:r>
+            <a:r>
+              <a:rPr lang="en-US" sz="3300" spc="176" dirty="0">
+                <a:solidFill>
+                  <a:srgbClr val="000000"/>
+                </a:solidFill>
+                <a:latin typeface="Poppins"/>
+              </a:rPr>
+              <a:t> e </a:t>
+            </a:r>
+            <a:r>
+              <a:rPr lang="en-US" sz="3300" spc="176" dirty="0" err="1">
+                <a:solidFill>
+                  <a:srgbClr val="000000"/>
+                </a:solidFill>
+                <a:latin typeface="Poppins"/>
+              </a:rPr>
+              <a:t>exibimos</a:t>
+            </a:r>
+            <a:r>
+              <a:rPr lang="en-US" sz="3300" spc="176" dirty="0">
+                <a:solidFill>
+                  <a:srgbClr val="000000"/>
+                </a:solidFill>
+                <a:latin typeface="Poppins"/>
+              </a:rPr>
+              <a:t> </a:t>
+            </a:r>
+            <a:r>
+              <a:rPr lang="en-US" sz="3300" spc="176" dirty="0" err="1">
+                <a:solidFill>
+                  <a:srgbClr val="000000"/>
+                </a:solidFill>
+                <a:latin typeface="Poppins"/>
+              </a:rPr>
+              <a:t>uma</a:t>
+            </a:r>
+            <a:r>
+              <a:rPr lang="en-US" sz="3300" spc="176" dirty="0">
+                <a:solidFill>
+                  <a:srgbClr val="000000"/>
+                </a:solidFill>
+                <a:latin typeface="Poppins"/>
+              </a:rPr>
+              <a:t> </a:t>
+            </a:r>
+            <a:r>
+              <a:rPr lang="en-US" sz="3300" spc="176" dirty="0" err="1">
+                <a:solidFill>
+                  <a:srgbClr val="000000"/>
+                </a:solidFill>
+                <a:latin typeface="Poppins"/>
+              </a:rPr>
+              <a:t>mensagem</a:t>
+            </a:r>
+            <a:r>
+              <a:rPr lang="en-US" sz="3300" spc="176" dirty="0">
+                <a:solidFill>
+                  <a:srgbClr val="000000"/>
+                </a:solidFill>
+                <a:latin typeface="Poppins"/>
+              </a:rPr>
+              <a:t> de boas-</a:t>
+            </a:r>
+            <a:r>
+              <a:rPr lang="en-US" sz="3300" spc="176" dirty="0" err="1">
+                <a:solidFill>
+                  <a:srgbClr val="000000"/>
+                </a:solidFill>
+                <a:latin typeface="Poppins"/>
+              </a:rPr>
+              <a:t>vindas</a:t>
+            </a:r>
+            <a:r>
+              <a:rPr lang="en-US" sz="3300" spc="176" dirty="0">
+                <a:solidFill>
+                  <a:srgbClr val="000000"/>
+                </a:solidFill>
+                <a:latin typeface="Poppins"/>
+              </a:rPr>
+              <a:t>.</a:t>
+            </a:r>
+            <a:endParaRPr lang="en-US" sz="3300" spc="176">
+              <a:solidFill>
+                <a:srgbClr val="000000"/>
+              </a:solidFill>
+              <a:latin typeface="Poppins"/>
+              <a:cs typeface="Poppins"/>
+            </a:endParaRPr>
+          </a:p>
+          <a:p>
+            <a:pPr marL="760730" lvl="1" indent="-380365" algn="just">
               <a:lnSpc>
                 <a:spcPts val="3701"/>
               </a:lnSpc>
@@ -5855,32 +6391,201 @@
               <a:buChar char="•"/>
             </a:pPr>
             <a:r>
-              <a:rPr lang="en-US" sz="3524" spc="176">
+              <a:rPr lang="en-US" sz="3300" spc="176" dirty="0">
                 <a:solidFill>
                   <a:srgbClr val="000000"/>
                 </a:solidFill>
                 <a:latin typeface="Poppins"/>
               </a:rPr>
-              <a:t>P</a:t>
-            </a:r>
-            <a:r>
-              <a:rPr lang="en-US" sz="3524" spc="176">
+              <a:t>Para </a:t>
+            </a:r>
+            <a:r>
+              <a:rPr lang="en-US" sz="3300" spc="176" dirty="0" err="1">
                 <a:solidFill>
                   <a:srgbClr val="000000"/>
                 </a:solidFill>
                 <a:latin typeface="Poppins"/>
               </a:rPr>
-              <a:t>ara isso, passamos</a:t>
-            </a:r>
-            <a:r>
-              <a:rPr lang="en-US" sz="3524" spc="176">
+              <a:t>isso</a:t>
+            </a:r>
+            <a:r>
+              <a:rPr lang="en-US" sz="3300" spc="176" dirty="0">
                 <a:solidFill>
                   <a:srgbClr val="000000"/>
                 </a:solidFill>
                 <a:latin typeface="Poppins"/>
               </a:rPr>
-              <a:t> o valor digitado no TextField da HomePage para a SecondPage quando o botão "Enviar" é clicado.</a:t>
-            </a:r>
+              <a:t>, </a:t>
+            </a:r>
+            <a:r>
+              <a:rPr lang="en-US" sz="3300" spc="176" dirty="0" err="1">
+                <a:solidFill>
+                  <a:srgbClr val="000000"/>
+                </a:solidFill>
+                <a:latin typeface="Poppins"/>
+              </a:rPr>
+              <a:t>passamos</a:t>
+            </a:r>
+            <a:r>
+              <a:rPr lang="en-US" sz="3300" spc="176" dirty="0">
+                <a:solidFill>
+                  <a:srgbClr val="000000"/>
+                </a:solidFill>
+                <a:latin typeface="Poppins"/>
+              </a:rPr>
+              <a:t> o valor </a:t>
+            </a:r>
+            <a:r>
+              <a:rPr lang="en-US" sz="3300" spc="176" dirty="0" err="1">
+                <a:solidFill>
+                  <a:srgbClr val="000000"/>
+                </a:solidFill>
+                <a:latin typeface="Poppins"/>
+              </a:rPr>
+              <a:t>digitado</a:t>
+            </a:r>
+            <a:r>
+              <a:rPr lang="en-US" sz="3300" spc="176" dirty="0">
+                <a:solidFill>
+                  <a:srgbClr val="000000"/>
+                </a:solidFill>
+                <a:latin typeface="Poppins"/>
+              </a:rPr>
+              <a:t> no </a:t>
+            </a:r>
+            <a:r>
+              <a:rPr lang="en-US" sz="3300" spc="176" dirty="0" err="1">
+                <a:solidFill>
+                  <a:srgbClr val="000000"/>
+                </a:solidFill>
+                <a:latin typeface="Poppins"/>
+              </a:rPr>
+              <a:t>TextField</a:t>
+            </a:r>
+            <a:r>
+              <a:rPr lang="en-US" sz="3300" spc="176" dirty="0">
+                <a:solidFill>
+                  <a:srgbClr val="000000"/>
+                </a:solidFill>
+                <a:latin typeface="Poppins"/>
+              </a:rPr>
+              <a:t> da </a:t>
+            </a:r>
+            <a:r>
+              <a:rPr lang="en-US" sz="3300" spc="176" dirty="0" err="1">
+                <a:solidFill>
+                  <a:srgbClr val="000000"/>
+                </a:solidFill>
+                <a:latin typeface="Poppins"/>
+              </a:rPr>
+              <a:t>HomePage</a:t>
+            </a:r>
+            <a:r>
+              <a:rPr lang="en-US" sz="3300" spc="176" dirty="0">
+                <a:solidFill>
+                  <a:srgbClr val="000000"/>
+                </a:solidFill>
+                <a:latin typeface="Poppins"/>
+              </a:rPr>
+              <a:t> para a </a:t>
+            </a:r>
+            <a:r>
+              <a:rPr lang="en-US" sz="3300" spc="176" dirty="0" err="1">
+                <a:solidFill>
+                  <a:srgbClr val="000000"/>
+                </a:solidFill>
+                <a:latin typeface="Poppins"/>
+              </a:rPr>
+              <a:t>SecondPage</a:t>
+            </a:r>
+            <a:r>
+              <a:rPr lang="en-US" sz="3300" spc="176" dirty="0">
+                <a:solidFill>
+                  <a:srgbClr val="000000"/>
+                </a:solidFill>
+                <a:latin typeface="Poppins"/>
+              </a:rPr>
+              <a:t>, </a:t>
+            </a:r>
+            <a:r>
+              <a:rPr lang="en-US" sz="3300" spc="176" dirty="0" err="1">
+                <a:solidFill>
+                  <a:srgbClr val="000000"/>
+                </a:solidFill>
+                <a:latin typeface="Poppins"/>
+              </a:rPr>
+              <a:t>quando</a:t>
+            </a:r>
+            <a:r>
+              <a:rPr lang="en-US" sz="3300" spc="176" dirty="0">
+                <a:solidFill>
+                  <a:srgbClr val="000000"/>
+                </a:solidFill>
+                <a:latin typeface="Poppins"/>
+              </a:rPr>
+              <a:t> o </a:t>
+            </a:r>
+            <a:r>
+              <a:rPr lang="en-US" sz="3300" spc="176" dirty="0" err="1">
+                <a:solidFill>
+                  <a:srgbClr val="000000"/>
+                </a:solidFill>
+                <a:latin typeface="Poppins"/>
+              </a:rPr>
+              <a:t>botão</a:t>
+            </a:r>
+            <a:r>
+              <a:rPr lang="en-US" sz="3300" spc="176" dirty="0">
+                <a:solidFill>
+                  <a:srgbClr val="000000"/>
+                </a:solidFill>
+                <a:latin typeface="Poppins"/>
+              </a:rPr>
+              <a:t> "</a:t>
+            </a:r>
+            <a:r>
+              <a:rPr lang="en-US" sz="3300" spc="176" dirty="0" err="1">
+                <a:solidFill>
+                  <a:srgbClr val="000000"/>
+                </a:solidFill>
+                <a:latin typeface="Poppins"/>
+              </a:rPr>
+              <a:t>Enviar</a:t>
+            </a:r>
+            <a:r>
+              <a:rPr lang="en-US" sz="3300" spc="176" dirty="0">
+                <a:solidFill>
+                  <a:srgbClr val="000000"/>
+                </a:solidFill>
+                <a:latin typeface="Poppins"/>
+              </a:rPr>
+              <a:t>" é </a:t>
+            </a:r>
+            <a:r>
+              <a:rPr lang="en-US" sz="3300" spc="176" dirty="0" err="1">
+                <a:solidFill>
+                  <a:srgbClr val="000000"/>
+                </a:solidFill>
+                <a:latin typeface="Poppins"/>
+              </a:rPr>
+              <a:t>clicado</a:t>
+            </a:r>
+            <a:r>
+              <a:rPr lang="en-US" sz="3300" spc="176" dirty="0">
+                <a:solidFill>
+                  <a:srgbClr val="000000"/>
+                </a:solidFill>
+                <a:latin typeface="Poppins"/>
+              </a:rPr>
+              <a:t>.</a:t>
+            </a:r>
+            <a:endParaRPr lang="en-US" sz="3300" spc="176" dirty="0">
+              <a:solidFill>
+                <a:srgbClr val="000000"/>
+              </a:solidFill>
+              <a:latin typeface="Poppins"/>
+              <a:cs typeface="Poppins"/>
+            </a:endParaRPr>
           </a:p>
         </p:txBody>
       </p:sp>
@@ -5893,7 +6598,7 @@
 </file>
 
 <file path=ppt/slides/slide8.xml><?xml version="1.0" encoding="utf-8"?>
-<p:sld xmlns:p="http://schemas.openxmlformats.org/presentationml/2006/main" xmlns:a="http://schemas.openxmlformats.org/drawingml/2006/main">
+<p:sld xmlns:a="http://schemas.openxmlformats.org/drawingml/2006/main" xmlns:r="http://schemas.openxmlformats.org/officeDocument/2006/relationships" xmlns:p="http://schemas.openxmlformats.org/presentationml/2006/main">
   <p:cSld>
     <p:spTree>
       <p:nvGrpSpPr>
@@ -5911,7 +6616,7 @@
       </p:grpSpPr>
       <p:grpSp>
         <p:nvGrpSpPr>
-          <p:cNvPr name="Group 2" id="2"/>
+          <p:cNvPr id="2" name="Group 2"/>
           <p:cNvGrpSpPr/>
           <p:nvPr/>
         </p:nvGrpSpPr>
@@ -5925,12 +6630,12 @@
         </p:grpSpPr>
         <p:sp>
           <p:nvSpPr>
-            <p:cNvPr name="Freeform 3" id="3"/>
+            <p:cNvPr id="3" name="Freeform 3"/>
             <p:cNvSpPr/>
             <p:nvPr/>
           </p:nvSpPr>
           <p:spPr>
-            <a:xfrm flipH="false" flipV="false" rot="0">
+            <a:xfrm>
               <a:off x="0" y="0"/>
               <a:ext cx="6350000" cy="6339840"/>
             </a:xfrm>
@@ -5939,9 +6644,9 @@
               <a:gdLst/>
               <a:ahLst/>
               <a:cxnLst/>
-              <a:rect r="r" b="b" t="t" l="l"/>
+              <a:rect l="l" t="t" r="r" b="b"/>
               <a:pathLst>
-                <a:path h="6339840" w="6350000">
+                <a:path w="6350000" h="6339840">
                   <a:moveTo>
                     <a:pt x="6350000" y="6339840"/>
                   </a:moveTo>
@@ -5966,12 +6671,12 @@
       </p:grpSp>
       <p:sp>
         <p:nvSpPr>
-          <p:cNvPr name="TextBox 4" id="4"/>
-          <p:cNvSpPr txBox="true"/>
+          <p:cNvPr id="4" name="TextBox 4"/>
+          <p:cNvSpPr txBox="1"/>
           <p:nvPr/>
         </p:nvSpPr>
         <p:spPr>
-          <a:xfrm rot="0">
+          <a:xfrm>
             <a:off x="4716086" y="379832"/>
             <a:ext cx="8855829" cy="895350"/>
           </a:xfrm>
@@ -5980,7 +6685,7 @@
           </a:prstGeom>
         </p:spPr>
         <p:txBody>
-          <a:bodyPr anchor="t" rtlCol="false" tIns="0" lIns="0" bIns="0" rIns="0">
+          <a:bodyPr lIns="0" tIns="0" rIns="0" bIns="0" rtlCol="0" anchor="t">
             <a:spAutoFit/>
           </a:bodyPr>
           <a:lstStyle/>
@@ -6004,12 +6709,12 @@
       </p:sp>
       <p:sp>
         <p:nvSpPr>
-          <p:cNvPr name="TextBox 5" id="5"/>
-          <p:cNvSpPr txBox="true"/>
+          <p:cNvPr id="5" name="TextBox 5"/>
+          <p:cNvSpPr txBox="1"/>
           <p:nvPr/>
         </p:nvSpPr>
         <p:spPr>
-          <a:xfrm rot="0">
+          <a:xfrm>
             <a:off x="0" y="2466958"/>
             <a:ext cx="17016117" cy="4161472"/>
           </a:xfrm>
@@ -6018,12 +6723,12 @@
           </a:prstGeom>
         </p:spPr>
         <p:txBody>
-          <a:bodyPr anchor="t" rtlCol="false" tIns="0" lIns="0" bIns="0" rIns="0">
+          <a:bodyPr lIns="0" tIns="0" rIns="0" bIns="0" rtlCol="0" anchor="t">
             <a:spAutoFit/>
           </a:bodyPr>
           <a:lstStyle/>
           <a:p>
-            <a:pPr algn="just" marL="744855" indent="-372428" lvl="1">
+            <a:pPr marL="744855" lvl="1" indent="-372428" algn="just">
               <a:lnSpc>
                 <a:spcPts val="3622"/>
               </a:lnSpc>
@@ -6041,7 +6746,7 @@
             </a:r>
           </a:p>
           <a:p>
-            <a:pPr algn="just" marL="1489710" indent="-496570" lvl="2">
+            <a:pPr marL="1489710" lvl="2" indent="-496570" algn="just">
               <a:lnSpc>
                 <a:spcPts val="3622"/>
               </a:lnSpc>
@@ -6062,12 +6767,12 @@
       </p:sp>
       <p:sp>
         <p:nvSpPr>
-          <p:cNvPr name="TextBox 6" id="6"/>
-          <p:cNvSpPr txBox="true"/>
+          <p:cNvPr id="6" name="TextBox 6"/>
+          <p:cNvSpPr txBox="1"/>
           <p:nvPr/>
         </p:nvSpPr>
         <p:spPr>
-          <a:xfrm rot="0">
+          <a:xfrm>
             <a:off x="0" y="6561755"/>
             <a:ext cx="17016117" cy="2417513"/>
           </a:xfrm>
@@ -6076,12 +6781,12 @@
           </a:prstGeom>
         </p:spPr>
         <p:txBody>
-          <a:bodyPr anchor="t" rtlCol="false" tIns="0" lIns="0" bIns="0" rIns="0">
+          <a:bodyPr lIns="0" tIns="0" rIns="0" bIns="0" rtlCol="0" anchor="t">
             <a:spAutoFit/>
           </a:bodyPr>
           <a:lstStyle/>
           <a:p>
-            <a:pPr algn="just" marL="744277" indent="-372138" lvl="1">
+            <a:pPr marL="744277" lvl="1" indent="-372138" algn="just">
               <a:lnSpc>
                 <a:spcPts val="4826"/>
               </a:lnSpc>
@@ -6109,7 +6814,7 @@
 </file>
 
 <file path=ppt/slides/slide9.xml><?xml version="1.0" encoding="utf-8"?>
-<p:sld xmlns:p="http://schemas.openxmlformats.org/presentationml/2006/main" xmlns:a="http://schemas.openxmlformats.org/drawingml/2006/main">
+<p:sld xmlns:a="http://schemas.openxmlformats.org/drawingml/2006/main" xmlns:r="http://schemas.openxmlformats.org/officeDocument/2006/relationships" xmlns:p="http://schemas.openxmlformats.org/presentationml/2006/main">
   <p:cSld>
     <p:spTree>
       <p:nvGrpSpPr>
@@ -6127,12 +6832,12 @@
       </p:grpSpPr>
       <p:sp>
         <p:nvSpPr>
-          <p:cNvPr name="TextBox 2" id="2"/>
-          <p:cNvSpPr txBox="true"/>
+          <p:cNvPr id="2" name="TextBox 2"/>
+          <p:cNvSpPr txBox="1"/>
           <p:nvPr/>
         </p:nvSpPr>
         <p:spPr>
-          <a:xfrm rot="0">
+          <a:xfrm>
             <a:off x="3182761" y="3439714"/>
             <a:ext cx="11922478" cy="3405598"/>
           </a:xfrm>
@@ -6141,7 +6846,7 @@
           </a:prstGeom>
         </p:spPr>
         <p:txBody>
-          <a:bodyPr anchor="t" rtlCol="false" tIns="0" lIns="0" bIns="0" rIns="0">
+          <a:bodyPr lIns="0" tIns="0" rIns="0" bIns="0" rtlCol="0" anchor="t">
             <a:spAutoFit/>
           </a:bodyPr>
           <a:lstStyle/>
@@ -6165,7 +6870,7 @@
       </p:sp>
       <p:grpSp>
         <p:nvGrpSpPr>
-          <p:cNvPr name="Group 3" id="3"/>
+          <p:cNvPr id="3" name="Group 3"/>
           <p:cNvGrpSpPr/>
           <p:nvPr/>
         </p:nvGrpSpPr>
@@ -6179,12 +6884,12 @@
         </p:grpSpPr>
         <p:sp>
           <p:nvSpPr>
-            <p:cNvPr name="Freeform 4" id="4"/>
+            <p:cNvPr id="4" name="Freeform 4"/>
             <p:cNvSpPr/>
             <p:nvPr/>
           </p:nvSpPr>
           <p:spPr>
-            <a:xfrm flipH="false" flipV="false" rot="0">
+            <a:xfrm>
               <a:off x="0" y="0"/>
               <a:ext cx="6350000" cy="6339840"/>
             </a:xfrm>
@@ -6193,9 +6898,9 @@
               <a:gdLst/>
               <a:ahLst/>
               <a:cxnLst/>
-              <a:rect r="r" b="b" t="t" l="l"/>
+              <a:rect l="l" t="t" r="r" b="b"/>
               <a:pathLst>
-                <a:path h="6339840" w="6350000">
+                <a:path w="6350000" h="6339840">
                   <a:moveTo>
                     <a:pt x="6350000" y="6339840"/>
                   </a:moveTo>

</xml_diff>